<commit_message>
Updated VPC box & icon to new standard (purple)
</commit_message>
<xml_diff>
--- a/doc/eks-architecture-examples/discngine-3decision-architecture-diagram.pptx
+++ b/doc/eks-architecture-examples/discngine-3decision-architecture-diagram.pptx
@@ -243,7 +243,7 @@
           <a:p>
             <a:fld id="{87F3BBB2-E533-43A8-AA78-2DC6FC5FE5A0}" type="datetimeFigureOut">
               <a:rPr lang="en-US" smtClean="0"/>
-              <a:t>9/15/2022</a:t>
+              <a:t>1/31/2023</a:t>
             </a:fld>
             <a:endParaRPr lang="en-US"/>
           </a:p>
@@ -413,7 +413,7 @@
           <a:p>
             <a:fld id="{87F3BBB2-E533-43A8-AA78-2DC6FC5FE5A0}" type="datetimeFigureOut">
               <a:rPr lang="en-US" smtClean="0"/>
-              <a:t>9/15/2022</a:t>
+              <a:t>1/31/2023</a:t>
             </a:fld>
             <a:endParaRPr lang="en-US"/>
           </a:p>
@@ -593,7 +593,7 @@
           <a:p>
             <a:fld id="{87F3BBB2-E533-43A8-AA78-2DC6FC5FE5A0}" type="datetimeFigureOut">
               <a:rPr lang="en-US" smtClean="0"/>
-              <a:t>9/15/2022</a:t>
+              <a:t>1/31/2023</a:t>
             </a:fld>
             <a:endParaRPr lang="en-US"/>
           </a:p>
@@ -763,7 +763,7 @@
           <a:p>
             <a:fld id="{87F3BBB2-E533-43A8-AA78-2DC6FC5FE5A0}" type="datetimeFigureOut">
               <a:rPr lang="en-US" smtClean="0"/>
-              <a:t>9/15/2022</a:t>
+              <a:t>1/31/2023</a:t>
             </a:fld>
             <a:endParaRPr lang="en-US"/>
           </a:p>
@@ -1007,7 +1007,7 @@
           <a:p>
             <a:fld id="{87F3BBB2-E533-43A8-AA78-2DC6FC5FE5A0}" type="datetimeFigureOut">
               <a:rPr lang="en-US" smtClean="0"/>
-              <a:t>9/15/2022</a:t>
+              <a:t>1/31/2023</a:t>
             </a:fld>
             <a:endParaRPr lang="en-US"/>
           </a:p>
@@ -1239,7 +1239,7 @@
           <a:p>
             <a:fld id="{87F3BBB2-E533-43A8-AA78-2DC6FC5FE5A0}" type="datetimeFigureOut">
               <a:rPr lang="en-US" smtClean="0"/>
-              <a:t>9/15/2022</a:t>
+              <a:t>1/31/2023</a:t>
             </a:fld>
             <a:endParaRPr lang="en-US"/>
           </a:p>
@@ -1606,7 +1606,7 @@
           <a:p>
             <a:fld id="{87F3BBB2-E533-43A8-AA78-2DC6FC5FE5A0}" type="datetimeFigureOut">
               <a:rPr lang="en-US" smtClean="0"/>
-              <a:t>9/15/2022</a:t>
+              <a:t>1/31/2023</a:t>
             </a:fld>
             <a:endParaRPr lang="en-US"/>
           </a:p>
@@ -1724,7 +1724,7 @@
           <a:p>
             <a:fld id="{87F3BBB2-E533-43A8-AA78-2DC6FC5FE5A0}" type="datetimeFigureOut">
               <a:rPr lang="en-US" smtClean="0"/>
-              <a:t>9/15/2022</a:t>
+              <a:t>1/31/2023</a:t>
             </a:fld>
             <a:endParaRPr lang="en-US"/>
           </a:p>
@@ -1819,7 +1819,7 @@
           <a:p>
             <a:fld id="{87F3BBB2-E533-43A8-AA78-2DC6FC5FE5A0}" type="datetimeFigureOut">
               <a:rPr lang="en-US" smtClean="0"/>
-              <a:t>9/15/2022</a:t>
+              <a:t>1/31/2023</a:t>
             </a:fld>
             <a:endParaRPr lang="en-US"/>
           </a:p>
@@ -2096,7 +2096,7 @@
           <a:p>
             <a:fld id="{87F3BBB2-E533-43A8-AA78-2DC6FC5FE5A0}" type="datetimeFigureOut">
               <a:rPr lang="en-US" smtClean="0"/>
-              <a:t>9/15/2022</a:t>
+              <a:t>1/31/2023</a:t>
             </a:fld>
             <a:endParaRPr lang="en-US"/>
           </a:p>
@@ -2353,7 +2353,7 @@
           <a:p>
             <a:fld id="{87F3BBB2-E533-43A8-AA78-2DC6FC5FE5A0}" type="datetimeFigureOut">
               <a:rPr lang="en-US" smtClean="0"/>
-              <a:t>9/15/2022</a:t>
+              <a:t>1/31/2023</a:t>
             </a:fld>
             <a:endParaRPr lang="en-US"/>
           </a:p>
@@ -2566,7 +2566,7 @@
           <a:p>
             <a:fld id="{87F3BBB2-E533-43A8-AA78-2DC6FC5FE5A0}" type="datetimeFigureOut">
               <a:rPr lang="en-US" smtClean="0"/>
-              <a:t>9/15/2022</a:t>
+              <a:t>1/31/2023</a:t>
             </a:fld>
             <a:endParaRPr lang="en-US"/>
           </a:p>
@@ -3269,10 +3269,10 @@
       </p:sp>
       <p:sp>
         <p:nvSpPr>
-          <p:cNvPr id="6" name="Rectangle 5">
+          <p:cNvPr id="7" name="Rectangle 6">
             <a:extLst>
               <a:ext uri="{FF2B5EF4-FFF2-40B4-BE49-F238E27FC236}">
-                <a16:creationId xmlns:a16="http://schemas.microsoft.com/office/drawing/2014/main" id="{E224EF4A-F530-439B-8E10-A6186EC36069}"/>
+                <a16:creationId xmlns:a16="http://schemas.microsoft.com/office/drawing/2014/main" id="{5CE804D4-5B67-4F1D-ACB3-17E80D07136F}"/>
               </a:ext>
             </a:extLst>
           </p:cNvPr>
@@ -3281,8 +3281,8 @@
         </p:nvSpPr>
         <p:spPr>
           <a:xfrm>
-            <a:off x="5478779" y="4389120"/>
-            <a:ext cx="10226043" cy="4297680"/>
+            <a:off x="5212080" y="3657600"/>
+            <a:ext cx="10666095" cy="6600825"/>
           </a:xfrm>
           <a:prstGeom prst="rect">
             <a:avLst/>
@@ -3290,7 +3290,7 @@
           <a:noFill/>
           <a:ln w="12700">
             <a:solidFill>
-              <a:srgbClr val="1E8900"/>
+              <a:schemeClr val="tx1"/>
             </a:solidFill>
           </a:ln>
         </p:spPr>
@@ -3325,76 +3325,6 @@
             </a:pPr>
             <a:r>
               <a:rPr lang="en-US" sz="1200" dirty="0">
-                <a:ln w="0"/>
-                <a:solidFill>
-                  <a:srgbClr val="1E8900"/>
-                </a:solidFill>
-                <a:latin typeface="Arial" panose="020B0604020202020204" pitchFamily="34" charset="0"/>
-                <a:cs typeface="Arial" panose="020B0604020202020204" pitchFamily="34" charset="0"/>
-              </a:rPr>
-              <a:t>VPC</a:t>
-            </a:r>
-          </a:p>
-        </p:txBody>
-      </p:sp>
-      <p:sp>
-        <p:nvSpPr>
-          <p:cNvPr id="7" name="Rectangle 6">
-            <a:extLst>
-              <a:ext uri="{FF2B5EF4-FFF2-40B4-BE49-F238E27FC236}">
-                <a16:creationId xmlns:a16="http://schemas.microsoft.com/office/drawing/2014/main" id="{5CE804D4-5B67-4F1D-ACB3-17E80D07136F}"/>
-              </a:ext>
-            </a:extLst>
-          </p:cNvPr>
-          <p:cNvSpPr/>
-          <p:nvPr/>
-        </p:nvSpPr>
-        <p:spPr>
-          <a:xfrm>
-            <a:off x="5212080" y="3657600"/>
-            <a:ext cx="10666095" cy="6600825"/>
-          </a:xfrm>
-          <a:prstGeom prst="rect">
-            <a:avLst/>
-          </a:prstGeom>
-          <a:noFill/>
-          <a:ln w="12700">
-            <a:solidFill>
-              <a:schemeClr val="tx1"/>
-            </a:solidFill>
-          </a:ln>
-        </p:spPr>
-        <p:style>
-          <a:lnRef idx="2">
-            <a:schemeClr val="accent1">
-              <a:shade val="50000"/>
-            </a:schemeClr>
-          </a:lnRef>
-          <a:fillRef idx="1">
-            <a:schemeClr val="accent1"/>
-          </a:fillRef>
-          <a:effectRef idx="0">
-            <a:schemeClr val="accent1"/>
-          </a:effectRef>
-          <a:fontRef idx="minor">
-            <a:schemeClr val="lt1"/>
-          </a:fontRef>
-        </p:style>
-        <p:txBody>
-          <a:bodyPr lIns="502920" tIns="91440"/>
-          <a:lstStyle/>
-          <a:p>
-            <a:pPr eaLnBrk="1" fontAlgn="auto" hangingPunct="1">
-              <a:spcBef>
-                <a:spcPts val="0"/>
-              </a:spcBef>
-              <a:spcAft>
-                <a:spcPts val="0"/>
-              </a:spcAft>
-              <a:defRPr/>
-            </a:pPr>
-            <a:r>
-              <a:rPr lang="en-US" sz="1200" dirty="0">
                 <a:solidFill>
                   <a:sysClr val="windowText" lastClr="000000"/>
                 </a:solidFill>
@@ -3434,42 +3364,6 @@
         <p:spPr>
           <a:xfrm>
             <a:off x="5212080" y="3657600"/>
-            <a:ext cx="381000" cy="381000"/>
-          </a:xfrm>
-          <a:prstGeom prst="rect">
-            <a:avLst/>
-          </a:prstGeom>
-        </p:spPr>
-      </p:pic>
-      <p:pic>
-        <p:nvPicPr>
-          <p:cNvPr id="9" name="Graphic 8">
-            <a:extLst>
-              <a:ext uri="{FF2B5EF4-FFF2-40B4-BE49-F238E27FC236}">
-                <a16:creationId xmlns:a16="http://schemas.microsoft.com/office/drawing/2014/main" id="{00BE814C-5D37-4C59-ABEE-E4B7E26BD5B1}"/>
-              </a:ext>
-            </a:extLst>
-          </p:cNvPr>
-          <p:cNvPicPr>
-            <a:picLocks noChangeAspect="1"/>
-          </p:cNvPicPr>
-          <p:nvPr/>
-        </p:nvPicPr>
-        <p:blipFill>
-          <a:blip r:embed="rId4">
-            <a:extLst>
-              <a:ext uri="{96DAC541-7B7A-43D3-8B79-37D633B846F1}">
-                <asvg:svgBlip xmlns:asvg="http://schemas.microsoft.com/office/drawing/2016/SVG/main" r:embed="rId5"/>
-              </a:ext>
-            </a:extLst>
-          </a:blip>
-          <a:stretch>
-            <a:fillRect/>
-          </a:stretch>
-        </p:blipFill>
-        <p:spPr>
-          <a:xfrm>
-            <a:off x="5478780" y="4389120"/>
             <a:ext cx="381000" cy="381000"/>
           </a:xfrm>
           <a:prstGeom prst="rect">
@@ -3716,10 +3610,10 @@
           <p:nvPr/>
         </p:nvPicPr>
         <p:blipFill>
-          <a:blip r:embed="rId6">
+          <a:blip r:embed="rId4">
             <a:extLst>
               <a:ext uri="{96DAC541-7B7A-43D3-8B79-37D633B846F1}">
-                <asvg:svgBlip xmlns:asvg="http://schemas.microsoft.com/office/drawing/2016/SVG/main" r:embed="rId7"/>
+                <asvg:svgBlip xmlns:asvg="http://schemas.microsoft.com/office/drawing/2016/SVG/main" r:embed="rId5"/>
               </a:ext>
             </a:extLst>
           </a:blip>
@@ -3752,10 +3646,10 @@
           <p:nvPr/>
         </p:nvPicPr>
         <p:blipFill>
-          <a:blip r:embed="rId8">
+          <a:blip r:embed="rId6">
             <a:extLst>
               <a:ext uri="{96DAC541-7B7A-43D3-8B79-37D633B846F1}">
-                <asvg:svgBlip xmlns:asvg="http://schemas.microsoft.com/office/drawing/2016/SVG/main" r:embed="rId9"/>
+                <asvg:svgBlip xmlns:asvg="http://schemas.microsoft.com/office/drawing/2016/SVG/main" r:embed="rId7"/>
               </a:ext>
             </a:extLst>
           </a:blip>
@@ -3788,7 +3682,7 @@
           <p:nvPr/>
         </p:nvPicPr>
         <p:blipFill>
-          <a:blip r:embed="rId10" cstate="print">
+          <a:blip r:embed="rId8" cstate="print">
             <a:extLst>
               <a:ext uri="{28A0092B-C50C-407E-A947-70E740481C1C}">
                 <a14:useLocalDpi xmlns:a14="http://schemas.microsoft.com/office/drawing/2010/main" val="0"/>
@@ -4051,7 +3945,7 @@
           <p:nvPr/>
         </p:nvPicPr>
         <p:blipFill>
-          <a:blip r:embed="rId11" cstate="print">
+          <a:blip r:embed="rId9" cstate="print">
             <a:extLst>
               <a:ext uri="{28A0092B-C50C-407E-A947-70E740481C1C}">
                 <a14:useLocalDpi xmlns:a14="http://schemas.microsoft.com/office/drawing/2010/main" val="0"/>
@@ -5077,7 +4971,7 @@
           <p:nvPr/>
         </p:nvPicPr>
         <p:blipFill>
-          <a:blip r:embed="rId12">
+          <a:blip r:embed="rId10">
             <a:extLst>
               <a:ext uri="{28A0092B-C50C-407E-A947-70E740481C1C}">
                 <a14:useLocalDpi xmlns:a14="http://schemas.microsoft.com/office/drawing/2010/main" val="0"/>
@@ -5137,10 +5031,10 @@
           <p:nvPr/>
         </p:nvPicPr>
         <p:blipFill>
-          <a:blip r:embed="rId13">
+          <a:blip r:embed="rId11">
             <a:extLst>
               <a:ext uri="{96DAC541-7B7A-43D3-8B79-37D633B846F1}">
-                <asvg:svgBlip xmlns:asvg="http://schemas.microsoft.com/office/drawing/2016/SVG/main" r:embed="rId14"/>
+                <asvg:svgBlip xmlns:asvg="http://schemas.microsoft.com/office/drawing/2016/SVG/main" r:embed="rId12"/>
               </a:ext>
             </a:extLst>
           </a:blip>
@@ -5173,10 +5067,10 @@
           <p:nvPr/>
         </p:nvPicPr>
         <p:blipFill>
-          <a:blip r:embed="rId13">
+          <a:blip r:embed="rId11">
             <a:extLst>
               <a:ext uri="{96DAC541-7B7A-43D3-8B79-37D633B846F1}">
-                <asvg:svgBlip xmlns:asvg="http://schemas.microsoft.com/office/drawing/2016/SVG/main" r:embed="rId14"/>
+                <asvg:svgBlip xmlns:asvg="http://schemas.microsoft.com/office/drawing/2016/SVG/main" r:embed="rId12"/>
               </a:ext>
             </a:extLst>
           </a:blip>
@@ -5450,10 +5344,10 @@
           <p:nvPr/>
         </p:nvPicPr>
         <p:blipFill>
-          <a:blip r:embed="rId6">
+          <a:blip r:embed="rId4">
             <a:extLst>
               <a:ext uri="{96DAC541-7B7A-43D3-8B79-37D633B846F1}">
-                <asvg:svgBlip xmlns:asvg="http://schemas.microsoft.com/office/drawing/2016/SVG/main" r:embed="rId7"/>
+                <asvg:svgBlip xmlns:asvg="http://schemas.microsoft.com/office/drawing/2016/SVG/main" r:embed="rId5"/>
               </a:ext>
             </a:extLst>
           </a:blip>
@@ -5486,10 +5380,10 @@
           <p:nvPr/>
         </p:nvPicPr>
         <p:blipFill>
-          <a:blip r:embed="rId8">
+          <a:blip r:embed="rId6">
             <a:extLst>
               <a:ext uri="{96DAC541-7B7A-43D3-8B79-37D633B846F1}">
-                <asvg:svgBlip xmlns:asvg="http://schemas.microsoft.com/office/drawing/2016/SVG/main" r:embed="rId9"/>
+                <asvg:svgBlip xmlns:asvg="http://schemas.microsoft.com/office/drawing/2016/SVG/main" r:embed="rId7"/>
               </a:ext>
             </a:extLst>
           </a:blip>
@@ -5522,7 +5416,7 @@
           <p:nvPr/>
         </p:nvPicPr>
         <p:blipFill>
-          <a:blip r:embed="rId10" cstate="print">
+          <a:blip r:embed="rId8" cstate="print">
             <a:extLst>
               <a:ext uri="{28A0092B-C50C-407E-A947-70E740481C1C}">
                 <a14:useLocalDpi xmlns:a14="http://schemas.microsoft.com/office/drawing/2010/main" val="0"/>
@@ -5785,7 +5679,7 @@
           <p:nvPr/>
         </p:nvPicPr>
         <p:blipFill>
-          <a:blip r:embed="rId11" cstate="print">
+          <a:blip r:embed="rId9" cstate="print">
             <a:extLst>
               <a:ext uri="{28A0092B-C50C-407E-A947-70E740481C1C}">
                 <a14:useLocalDpi xmlns:a14="http://schemas.microsoft.com/office/drawing/2010/main" val="0"/>
@@ -6006,11 +5900,11 @@
           <p:nvPr/>
         </p:nvPicPr>
         <p:blipFill>
-          <a:blip r:embed="rId15">
+          <a:blip r:embed="rId13">
             <a:extLst>
               <a:ext uri="{BEBA8EAE-BF5A-486C-A8C5-ECC9F3942E4B}">
                 <a14:imgProps xmlns:a14="http://schemas.microsoft.com/office/drawing/2010/main">
-                  <a14:imgLayer r:embed="rId16">
+                  <a14:imgLayer r:embed="rId14">
                     <a14:imgEffect>
                       <a14:artisticBlur/>
                     </a14:imgEffect>
@@ -6222,10 +6116,10 @@
           <p:nvPr/>
         </p:nvPicPr>
         <p:blipFill>
-          <a:blip r:embed="rId6">
+          <a:blip r:embed="rId4">
             <a:extLst>
               <a:ext uri="{96DAC541-7B7A-43D3-8B79-37D633B846F1}">
-                <asvg:svgBlip xmlns:asvg="http://schemas.microsoft.com/office/drawing/2016/SVG/main" r:embed="rId7"/>
+                <asvg:svgBlip xmlns:asvg="http://schemas.microsoft.com/office/drawing/2016/SVG/main" r:embed="rId5"/>
               </a:ext>
             </a:extLst>
           </a:blip>
@@ -6258,10 +6152,10 @@
           <p:nvPr/>
         </p:nvPicPr>
         <p:blipFill>
-          <a:blip r:embed="rId8">
+          <a:blip r:embed="rId6">
             <a:extLst>
               <a:ext uri="{96DAC541-7B7A-43D3-8B79-37D633B846F1}">
-                <asvg:svgBlip xmlns:asvg="http://schemas.microsoft.com/office/drawing/2016/SVG/main" r:embed="rId9"/>
+                <asvg:svgBlip xmlns:asvg="http://schemas.microsoft.com/office/drawing/2016/SVG/main" r:embed="rId7"/>
               </a:ext>
             </a:extLst>
           </a:blip>
@@ -6294,7 +6188,7 @@
           <p:nvPr/>
         </p:nvPicPr>
         <p:blipFill>
-          <a:blip r:embed="rId10" cstate="print">
+          <a:blip r:embed="rId8" cstate="print">
             <a:extLst>
               <a:ext uri="{28A0092B-C50C-407E-A947-70E740481C1C}">
                 <a14:useLocalDpi xmlns:a14="http://schemas.microsoft.com/office/drawing/2010/main" val="0"/>
@@ -6557,7 +6451,7 @@
           <p:nvPr/>
         </p:nvPicPr>
         <p:blipFill>
-          <a:blip r:embed="rId11" cstate="print">
+          <a:blip r:embed="rId9" cstate="print">
             <a:extLst>
               <a:ext uri="{28A0092B-C50C-407E-A947-70E740481C1C}">
                 <a14:useLocalDpi xmlns:a14="http://schemas.microsoft.com/office/drawing/2010/main" val="0"/>
@@ -6778,11 +6672,11 @@
           <p:nvPr/>
         </p:nvPicPr>
         <p:blipFill>
-          <a:blip r:embed="rId15">
+          <a:blip r:embed="rId13">
             <a:extLst>
               <a:ext uri="{BEBA8EAE-BF5A-486C-A8C5-ECC9F3942E4B}">
                 <a14:imgProps xmlns:a14="http://schemas.microsoft.com/office/drawing/2010/main">
-                  <a14:imgLayer r:embed="rId16">
+                  <a14:imgLayer r:embed="rId14">
                     <a14:imgEffect>
                       <a14:artisticBlur/>
                     </a14:imgEffect>
@@ -6847,7 +6741,7 @@
           <p:nvPr/>
         </p:nvPicPr>
         <p:blipFill>
-          <a:blip r:embed="rId17"/>
+          <a:blip r:embed="rId15"/>
           <a:srcRect/>
           <a:stretch/>
         </p:blipFill>
@@ -6890,6 +6784,126 @@
             <a:extLst>
               <a:ext uri="{FF2B5EF4-FFF2-40B4-BE49-F238E27FC236}">
                 <a16:creationId xmlns:a16="http://schemas.microsoft.com/office/drawing/2014/main" id="{C6AE94D9-8FC3-4CC3-BEC1-D8868CDAF30B}"/>
+              </a:ext>
+            </a:extLst>
+          </p:cNvPr>
+          <p:cNvPicPr>
+            <a:picLocks noChangeAspect="1" noChangeArrowheads="1"/>
+          </p:cNvPicPr>
+          <p:nvPr/>
+        </p:nvPicPr>
+        <p:blipFill>
+          <a:blip r:embed="rId16">
+            <a:extLst>
+              <a:ext uri="{28A0092B-C50C-407E-A947-70E740481C1C}">
+                <a14:useLocalDpi xmlns:a14="http://schemas.microsoft.com/office/drawing/2010/main" val="0"/>
+              </a:ext>
+            </a:extLst>
+          </a:blip>
+          <a:srcRect/>
+          <a:stretch>
+            <a:fillRect/>
+          </a:stretch>
+        </p:blipFill>
+        <p:spPr bwMode="auto">
+          <a:xfrm>
+            <a:off x="8834083" y="9102477"/>
+            <a:ext cx="762000" cy="762000"/>
+          </a:xfrm>
+          <a:prstGeom prst="rect">
+            <a:avLst/>
+          </a:prstGeom>
+          <a:noFill/>
+          <a:ln>
+            <a:noFill/>
+          </a:ln>
+          <a:extLst>
+            <a:ext uri="{909E8E84-426E-40DD-AFC4-6F175D3DCCD1}">
+              <a14:hiddenFill xmlns:a14="http://schemas.microsoft.com/office/drawing/2010/main">
+                <a:solidFill>
+                  <a:srgbClr val="FFFFFF"/>
+                </a:solidFill>
+              </a14:hiddenFill>
+            </a:ext>
+            <a:ext uri="{91240B29-F687-4F45-9708-019B960494DF}">
+              <a14:hiddenLine xmlns:a14="http://schemas.microsoft.com/office/drawing/2010/main" w="9525">
+                <a:solidFill>
+                  <a:srgbClr val="000000"/>
+                </a:solidFill>
+                <a:miter lim="800000"/>
+                <a:headEnd/>
+                <a:tailEnd/>
+              </a14:hiddenLine>
+            </a:ext>
+          </a:extLst>
+        </p:spPr>
+      </p:pic>
+      <p:pic>
+        <p:nvPicPr>
+          <p:cNvPr id="57" name="Graphic 17">
+            <a:extLst>
+              <a:ext uri="{FF2B5EF4-FFF2-40B4-BE49-F238E27FC236}">
+                <a16:creationId xmlns:a16="http://schemas.microsoft.com/office/drawing/2014/main" id="{0F0098D1-7284-4423-A181-2CFF8FF95B0F}"/>
+              </a:ext>
+            </a:extLst>
+          </p:cNvPr>
+          <p:cNvPicPr>
+            <a:picLocks noChangeAspect="1" noChangeArrowheads="1"/>
+          </p:cNvPicPr>
+          <p:nvPr/>
+        </p:nvPicPr>
+        <p:blipFill>
+          <a:blip r:embed="rId17">
+            <a:extLst>
+              <a:ext uri="{28A0092B-C50C-407E-A947-70E740481C1C}">
+                <a14:useLocalDpi xmlns:a14="http://schemas.microsoft.com/office/drawing/2010/main" val="0"/>
+              </a:ext>
+            </a:extLst>
+          </a:blip>
+          <a:srcRect/>
+          <a:stretch>
+            <a:fillRect/>
+          </a:stretch>
+        </p:blipFill>
+        <p:spPr bwMode="auto">
+          <a:xfrm>
+            <a:off x="10565227" y="9102477"/>
+            <a:ext cx="762000" cy="762000"/>
+          </a:xfrm>
+          <a:prstGeom prst="rect">
+            <a:avLst/>
+          </a:prstGeom>
+          <a:noFill/>
+          <a:ln>
+            <a:noFill/>
+          </a:ln>
+          <a:extLst>
+            <a:ext uri="{909E8E84-426E-40DD-AFC4-6F175D3DCCD1}">
+              <a14:hiddenFill xmlns:a14="http://schemas.microsoft.com/office/drawing/2010/main">
+                <a:solidFill>
+                  <a:srgbClr val="FFFFFF"/>
+                </a:solidFill>
+              </a14:hiddenFill>
+            </a:ext>
+            <a:ext uri="{91240B29-F687-4F45-9708-019B960494DF}">
+              <a14:hiddenLine xmlns:a14="http://schemas.microsoft.com/office/drawing/2010/main" w="9525">
+                <a:solidFill>
+                  <a:srgbClr val="000000"/>
+                </a:solidFill>
+                <a:miter lim="800000"/>
+                <a:headEnd/>
+                <a:tailEnd/>
+              </a14:hiddenLine>
+            </a:ext>
+          </a:extLst>
+        </p:spPr>
+      </p:pic>
+      <p:pic>
+        <p:nvPicPr>
+          <p:cNvPr id="62" name="Graphic 6">
+            <a:extLst>
+              <a:ext uri="{FF2B5EF4-FFF2-40B4-BE49-F238E27FC236}">
+                <a16:creationId xmlns:a16="http://schemas.microsoft.com/office/drawing/2014/main" id="{ECFF1106-CBAA-45E0-9A94-FC620828373A}"/>
               </a:ext>
             </a:extLst>
           </p:cNvPr>
@@ -6913,7 +6927,7 @@
         </p:blipFill>
         <p:spPr bwMode="auto">
           <a:xfrm>
-            <a:off x="8834083" y="9102477"/>
+            <a:off x="12308563" y="9102477"/>
             <a:ext cx="762000" cy="762000"/>
           </a:xfrm>
           <a:prstGeom prst="rect">
@@ -6946,10 +6960,10 @@
       </p:pic>
       <p:pic>
         <p:nvPicPr>
-          <p:cNvPr id="57" name="Graphic 17">
+          <p:cNvPr id="63" name="Graphic 21">
             <a:extLst>
               <a:ext uri="{FF2B5EF4-FFF2-40B4-BE49-F238E27FC236}">
-                <a16:creationId xmlns:a16="http://schemas.microsoft.com/office/drawing/2014/main" id="{0F0098D1-7284-4423-A181-2CFF8FF95B0F}"/>
+                <a16:creationId xmlns:a16="http://schemas.microsoft.com/office/drawing/2014/main" id="{42B75D60-C1A5-4DC5-8A46-B143144EAF10}"/>
               </a:ext>
             </a:extLst>
           </p:cNvPr>
@@ -6973,7 +6987,7 @@
         </p:blipFill>
         <p:spPr bwMode="auto">
           <a:xfrm>
-            <a:off x="10565227" y="9102477"/>
+            <a:off x="14046850" y="9102477"/>
             <a:ext cx="762000" cy="762000"/>
           </a:xfrm>
           <a:prstGeom prst="rect">
@@ -7004,124 +7018,109 @@
           </a:extLst>
         </p:spPr>
       </p:pic>
+      <p:sp>
+        <p:nvSpPr>
+          <p:cNvPr id="65" name="Rectangle 64">
+            <a:extLst>
+              <a:ext uri="{FF2B5EF4-FFF2-40B4-BE49-F238E27FC236}">
+                <a16:creationId xmlns:a16="http://schemas.microsoft.com/office/drawing/2014/main" id="{7B46BFA1-FFEF-4CD7-89B2-9C3BD0BD10E3}"/>
+              </a:ext>
+            </a:extLst>
+          </p:cNvPr>
+          <p:cNvSpPr/>
+          <p:nvPr/>
+        </p:nvSpPr>
+        <p:spPr bwMode="auto">
+          <a:xfrm>
+            <a:off x="5478778" y="4383072"/>
+            <a:ext cx="10226042" cy="4297680"/>
+          </a:xfrm>
+          <a:prstGeom prst="rect">
+            <a:avLst/>
+          </a:prstGeom>
+          <a:noFill/>
+          <a:ln w="12700">
+            <a:solidFill>
+              <a:srgbClr val="693BC5"/>
+            </a:solidFill>
+          </a:ln>
+        </p:spPr>
+        <p:style>
+          <a:lnRef idx="2">
+            <a:schemeClr val="accent1">
+              <a:shade val="50000"/>
+            </a:schemeClr>
+          </a:lnRef>
+          <a:fillRef idx="1">
+            <a:schemeClr val="accent1"/>
+          </a:fillRef>
+          <a:effectRef idx="0">
+            <a:schemeClr val="accent1"/>
+          </a:effectRef>
+          <a:fontRef idx="minor">
+            <a:schemeClr val="lt1"/>
+          </a:fontRef>
+        </p:style>
+        <p:txBody>
+          <a:bodyPr lIns="502920" tIns="91440"/>
+          <a:lstStyle/>
+          <a:p>
+            <a:pPr eaLnBrk="1" fontAlgn="auto" hangingPunct="1">
+              <a:spcBef>
+                <a:spcPts val="0"/>
+              </a:spcBef>
+              <a:spcAft>
+                <a:spcPts val="0"/>
+              </a:spcAft>
+              <a:defRPr/>
+            </a:pPr>
+            <a:r>
+              <a:rPr lang="en-US" sz="1200" dirty="0">
+                <a:ln w="0"/>
+                <a:solidFill>
+                  <a:srgbClr val="693BC5"/>
+                </a:solidFill>
+                <a:latin typeface="Arial" panose="020B0604020202020204" pitchFamily="34" charset="0"/>
+                <a:cs typeface="Arial" panose="020B0604020202020204" pitchFamily="34" charset="0"/>
+              </a:rPr>
+              <a:t>VPC</a:t>
+            </a:r>
+          </a:p>
+        </p:txBody>
+      </p:sp>
       <p:pic>
         <p:nvPicPr>
-          <p:cNvPr id="62" name="Graphic 6">
+          <p:cNvPr id="66" name="Graphic 65">
             <a:extLst>
               <a:ext uri="{FF2B5EF4-FFF2-40B4-BE49-F238E27FC236}">
-                <a16:creationId xmlns:a16="http://schemas.microsoft.com/office/drawing/2014/main" id="{ECFF1106-CBAA-45E0-9A94-FC620828373A}"/>
+                <a16:creationId xmlns:a16="http://schemas.microsoft.com/office/drawing/2014/main" id="{4DCC58C8-D301-4020-BA64-FF92329D4A56}"/>
               </a:ext>
             </a:extLst>
           </p:cNvPr>
           <p:cNvPicPr>
-            <a:picLocks noChangeAspect="1" noChangeArrowheads="1"/>
+            <a:picLocks noChangeAspect="1"/>
           </p:cNvPicPr>
           <p:nvPr/>
         </p:nvPicPr>
         <p:blipFill>
           <a:blip r:embed="rId20">
             <a:extLst>
-              <a:ext uri="{28A0092B-C50C-407E-A947-70E740481C1C}">
-                <a14:useLocalDpi xmlns:a14="http://schemas.microsoft.com/office/drawing/2010/main" val="0"/>
+              <a:ext uri="{96DAC541-7B7A-43D3-8B79-37D633B846F1}">
+                <asvg:svgBlip xmlns:asvg="http://schemas.microsoft.com/office/drawing/2016/SVG/main" r:embed="rId21"/>
               </a:ext>
             </a:extLst>
           </a:blip>
           <a:srcRect/>
-          <a:stretch>
-            <a:fillRect/>
-          </a:stretch>
+          <a:stretch/>
         </p:blipFill>
-        <p:spPr bwMode="auto">
-          <a:xfrm>
-            <a:off x="12308563" y="9102477"/>
-            <a:ext cx="762000" cy="762000"/>
+        <p:spPr>
+          <a:xfrm>
+            <a:off x="5480366" y="4383072"/>
+            <a:ext cx="381000" cy="381000"/>
           </a:xfrm>
           <a:prstGeom prst="rect">
             <a:avLst/>
           </a:prstGeom>
-          <a:noFill/>
-          <a:ln>
-            <a:noFill/>
-          </a:ln>
-          <a:extLst>
-            <a:ext uri="{909E8E84-426E-40DD-AFC4-6F175D3DCCD1}">
-              <a14:hiddenFill xmlns:a14="http://schemas.microsoft.com/office/drawing/2010/main">
-                <a:solidFill>
-                  <a:srgbClr val="FFFFFF"/>
-                </a:solidFill>
-              </a14:hiddenFill>
-            </a:ext>
-            <a:ext uri="{91240B29-F687-4F45-9708-019B960494DF}">
-              <a14:hiddenLine xmlns:a14="http://schemas.microsoft.com/office/drawing/2010/main" w="9525">
-                <a:solidFill>
-                  <a:srgbClr val="000000"/>
-                </a:solidFill>
-                <a:miter lim="800000"/>
-                <a:headEnd/>
-                <a:tailEnd/>
-              </a14:hiddenLine>
-            </a:ext>
-          </a:extLst>
-        </p:spPr>
-      </p:pic>
-      <p:pic>
-        <p:nvPicPr>
-          <p:cNvPr id="63" name="Graphic 21">
-            <a:extLst>
-              <a:ext uri="{FF2B5EF4-FFF2-40B4-BE49-F238E27FC236}">
-                <a16:creationId xmlns:a16="http://schemas.microsoft.com/office/drawing/2014/main" id="{42B75D60-C1A5-4DC5-8A46-B143144EAF10}"/>
-              </a:ext>
-            </a:extLst>
-          </p:cNvPr>
-          <p:cNvPicPr>
-            <a:picLocks noChangeAspect="1" noChangeArrowheads="1"/>
-          </p:cNvPicPr>
-          <p:nvPr/>
-        </p:nvPicPr>
-        <p:blipFill>
-          <a:blip r:embed="rId21">
-            <a:extLst>
-              <a:ext uri="{28A0092B-C50C-407E-A947-70E740481C1C}">
-                <a14:useLocalDpi xmlns:a14="http://schemas.microsoft.com/office/drawing/2010/main" val="0"/>
-              </a:ext>
-            </a:extLst>
-          </a:blip>
-          <a:srcRect/>
-          <a:stretch>
-            <a:fillRect/>
-          </a:stretch>
-        </p:blipFill>
-        <p:spPr bwMode="auto">
-          <a:xfrm>
-            <a:off x="14046850" y="9102477"/>
-            <a:ext cx="762000" cy="762000"/>
-          </a:xfrm>
-          <a:prstGeom prst="rect">
-            <a:avLst/>
-          </a:prstGeom>
-          <a:noFill/>
-          <a:ln>
-            <a:noFill/>
-          </a:ln>
-          <a:extLst>
-            <a:ext uri="{909E8E84-426E-40DD-AFC4-6F175D3DCCD1}">
-              <a14:hiddenFill xmlns:a14="http://schemas.microsoft.com/office/drawing/2010/main">
-                <a:solidFill>
-                  <a:srgbClr val="FFFFFF"/>
-                </a:solidFill>
-              </a14:hiddenFill>
-            </a:ext>
-            <a:ext uri="{91240B29-F687-4F45-9708-019B960494DF}">
-              <a14:hiddenLine xmlns:a14="http://schemas.microsoft.com/office/drawing/2010/main" w="9525">
-                <a:solidFill>
-                  <a:srgbClr val="000000"/>
-                </a:solidFill>
-                <a:miter lim="800000"/>
-                <a:headEnd/>
-                <a:tailEnd/>
-              </a14:hiddenLine>
-            </a:ext>
-          </a:extLst>
         </p:spPr>
       </p:pic>
     </p:spTree>

</xml_diff>

<commit_message>
Corrected icon size in one diagram
</commit_message>
<xml_diff>
--- a/doc/eks-architecture-examples/discngine-3decision-architecture-diagram.pptx
+++ b/doc/eks-architecture-examples/discngine-3decision-architecture-diagram.pptx
@@ -243,7 +243,7 @@
           <a:p>
             <a:fld id="{87F3BBB2-E533-43A8-AA78-2DC6FC5FE5A0}" type="datetimeFigureOut">
               <a:rPr lang="en-US" smtClean="0"/>
-              <a:t>1/31/2023</a:t>
+              <a:t>2/9/2023</a:t>
             </a:fld>
             <a:endParaRPr lang="en-US"/>
           </a:p>
@@ -413,7 +413,7 @@
           <a:p>
             <a:fld id="{87F3BBB2-E533-43A8-AA78-2DC6FC5FE5A0}" type="datetimeFigureOut">
               <a:rPr lang="en-US" smtClean="0"/>
-              <a:t>1/31/2023</a:t>
+              <a:t>2/9/2023</a:t>
             </a:fld>
             <a:endParaRPr lang="en-US"/>
           </a:p>
@@ -593,7 +593,7 @@
           <a:p>
             <a:fld id="{87F3BBB2-E533-43A8-AA78-2DC6FC5FE5A0}" type="datetimeFigureOut">
               <a:rPr lang="en-US" smtClean="0"/>
-              <a:t>1/31/2023</a:t>
+              <a:t>2/9/2023</a:t>
             </a:fld>
             <a:endParaRPr lang="en-US"/>
           </a:p>
@@ -763,7 +763,7 @@
           <a:p>
             <a:fld id="{87F3BBB2-E533-43A8-AA78-2DC6FC5FE5A0}" type="datetimeFigureOut">
               <a:rPr lang="en-US" smtClean="0"/>
-              <a:t>1/31/2023</a:t>
+              <a:t>2/9/2023</a:t>
             </a:fld>
             <a:endParaRPr lang="en-US"/>
           </a:p>
@@ -1007,7 +1007,7 @@
           <a:p>
             <a:fld id="{87F3BBB2-E533-43A8-AA78-2DC6FC5FE5A0}" type="datetimeFigureOut">
               <a:rPr lang="en-US" smtClean="0"/>
-              <a:t>1/31/2023</a:t>
+              <a:t>2/9/2023</a:t>
             </a:fld>
             <a:endParaRPr lang="en-US"/>
           </a:p>
@@ -1239,7 +1239,7 @@
           <a:p>
             <a:fld id="{87F3BBB2-E533-43A8-AA78-2DC6FC5FE5A0}" type="datetimeFigureOut">
               <a:rPr lang="en-US" smtClean="0"/>
-              <a:t>1/31/2023</a:t>
+              <a:t>2/9/2023</a:t>
             </a:fld>
             <a:endParaRPr lang="en-US"/>
           </a:p>
@@ -1606,7 +1606,7 @@
           <a:p>
             <a:fld id="{87F3BBB2-E533-43A8-AA78-2DC6FC5FE5A0}" type="datetimeFigureOut">
               <a:rPr lang="en-US" smtClean="0"/>
-              <a:t>1/31/2023</a:t>
+              <a:t>2/9/2023</a:t>
             </a:fld>
             <a:endParaRPr lang="en-US"/>
           </a:p>
@@ -1724,7 +1724,7 @@
           <a:p>
             <a:fld id="{87F3BBB2-E533-43A8-AA78-2DC6FC5FE5A0}" type="datetimeFigureOut">
               <a:rPr lang="en-US" smtClean="0"/>
-              <a:t>1/31/2023</a:t>
+              <a:t>2/9/2023</a:t>
             </a:fld>
             <a:endParaRPr lang="en-US"/>
           </a:p>
@@ -1819,7 +1819,7 @@
           <a:p>
             <a:fld id="{87F3BBB2-E533-43A8-AA78-2DC6FC5FE5A0}" type="datetimeFigureOut">
               <a:rPr lang="en-US" smtClean="0"/>
-              <a:t>1/31/2023</a:t>
+              <a:t>2/9/2023</a:t>
             </a:fld>
             <a:endParaRPr lang="en-US"/>
           </a:p>
@@ -2096,7 +2096,7 @@
           <a:p>
             <a:fld id="{87F3BBB2-E533-43A8-AA78-2DC6FC5FE5A0}" type="datetimeFigureOut">
               <a:rPr lang="en-US" smtClean="0"/>
-              <a:t>1/31/2023</a:t>
+              <a:t>2/9/2023</a:t>
             </a:fld>
             <a:endParaRPr lang="en-US"/>
           </a:p>
@@ -2353,7 +2353,7 @@
           <a:p>
             <a:fld id="{87F3BBB2-E533-43A8-AA78-2DC6FC5FE5A0}" type="datetimeFigureOut">
               <a:rPr lang="en-US" smtClean="0"/>
-              <a:t>1/31/2023</a:t>
+              <a:t>2/9/2023</a:t>
             </a:fld>
             <a:endParaRPr lang="en-US"/>
           </a:p>
@@ -2566,7 +2566,7 @@
           <a:p>
             <a:fld id="{87F3BBB2-E533-43A8-AA78-2DC6FC5FE5A0}" type="datetimeFigureOut">
               <a:rPr lang="en-US" smtClean="0"/>
-              <a:t>1/31/2023</a:t>
+              <a:t>2/9/2023</a:t>
             </a:fld>
             <a:endParaRPr lang="en-US"/>
           </a:p>
@@ -2973,10 +2973,10 @@
       </p:grpSpPr>
       <p:sp>
         <p:nvSpPr>
-          <p:cNvPr id="96" name="Rectangle 95">
+          <p:cNvPr id="67" name="Rectangle 66">
             <a:extLst>
               <a:ext uri="{FF2B5EF4-FFF2-40B4-BE49-F238E27FC236}">
-                <a16:creationId xmlns:a16="http://schemas.microsoft.com/office/drawing/2014/main" id="{DFACEE11-2F7D-4BC8-A2AB-946F5C7A3CA3}"/>
+                <a16:creationId xmlns:a16="http://schemas.microsoft.com/office/drawing/2014/main" id="{A780B0EF-0419-4857-97F0-EBA51E876D06}"/>
               </a:ext>
             </a:extLst>
           </p:cNvPr>
@@ -2985,8 +2985,8 @@
         </p:nvSpPr>
         <p:spPr>
           <a:xfrm>
-            <a:off x="13251180" y="7040880"/>
-            <a:ext cx="2103120" cy="1463040"/>
+            <a:off x="6547425" y="7019592"/>
+            <a:ext cx="2075481" cy="1463040"/>
           </a:xfrm>
           <a:prstGeom prst="rect">
             <a:avLst/>
@@ -2996,83 +2996,8 @@
               <a:alpha val="9804"/>
             </a:srgbClr>
           </a:solidFill>
-          <a:ln w="12700" cap="flat" cmpd="sng" algn="ctr">
+          <a:ln w="12700">
             <a:noFill/>
-            <a:prstDash val="dash"/>
-            <a:miter lim="800000"/>
-          </a:ln>
-          <a:effectLst/>
-        </p:spPr>
-        <p:txBody>
-          <a:bodyPr rot="0" spcFirstLastPara="0" vertOverflow="overflow" horzOverflow="overflow" vert="horz" wrap="square" lIns="338328" tIns="45720" rIns="91440" bIns="45720" numCol="1" spcCol="0" rtlCol="0" fromWordArt="0" anchor="t" anchorCtr="0" forceAA="0" compatLnSpc="1">
-            <a:prstTxWarp prst="textNoShape">
-              <a:avLst/>
-            </a:prstTxWarp>
-            <a:noAutofit/>
-          </a:bodyPr>
-          <a:lstStyle/>
-          <a:p>
-            <a:pPr marL="0" marR="0" lvl="0" indent="0" defTabSz="914400" eaLnBrk="1" fontAlgn="auto" latinLnBrk="0" hangingPunct="1">
-              <a:lnSpc>
-                <a:spcPct val="100000"/>
-              </a:lnSpc>
-              <a:spcBef>
-                <a:spcPts val="0"/>
-              </a:spcBef>
-              <a:spcAft>
-                <a:spcPts val="0"/>
-              </a:spcAft>
-              <a:buClrTx/>
-              <a:buSzTx/>
-              <a:buFontTx/>
-              <a:buNone/>
-              <a:tabLst/>
-              <a:defRPr/>
-            </a:pPr>
-            <a:r>
-              <a:rPr kumimoji="0" lang="en-US" sz="1200" b="0" i="0" u="none" strike="noStrike" kern="0" cap="none" spc="0" normalizeH="0" baseline="0" noProof="0" dirty="0">
-                <a:ln>
-                  <a:noFill/>
-                </a:ln>
-                <a:solidFill>
-                  <a:srgbClr val="007CBC"/>
-                </a:solidFill>
-                <a:effectLst/>
-                <a:uLnTx/>
-                <a:uFillTx/>
-                <a:latin typeface="Arial" panose="020B0604020202020204" pitchFamily="34" charset="0"/>
-                <a:cs typeface="Arial" panose="020B0604020202020204" pitchFamily="34" charset="0"/>
-              </a:rPr>
-              <a:t>Private subnet</a:t>
-            </a:r>
-          </a:p>
-        </p:txBody>
-      </p:sp>
-      <p:sp>
-        <p:nvSpPr>
-          <p:cNvPr id="60" name="Rectangle 59">
-            <a:extLst>
-              <a:ext uri="{FF2B5EF4-FFF2-40B4-BE49-F238E27FC236}">
-                <a16:creationId xmlns:a16="http://schemas.microsoft.com/office/drawing/2014/main" id="{16313980-912B-4B66-B892-A8136BB74A82}"/>
-              </a:ext>
-            </a:extLst>
-          </p:cNvPr>
-          <p:cNvSpPr/>
-          <p:nvPr/>
-        </p:nvSpPr>
-        <p:spPr>
-          <a:xfrm>
-            <a:off x="6850380" y="7406640"/>
-            <a:ext cx="8229600" cy="914400"/>
-          </a:xfrm>
-          <a:prstGeom prst="rect">
-            <a:avLst/>
-          </a:prstGeom>
-          <a:noFill/>
-          <a:ln w="12700">
-            <a:solidFill>
-              <a:srgbClr val="D86613"/>
-            </a:solidFill>
             <a:prstDash val="dash"/>
           </a:ln>
         </p:spPr>
@@ -3093,6 +3018,328 @@
           </a:fontRef>
         </p:style>
         <p:txBody>
+          <a:bodyPr lIns="502920"/>
+          <a:lstStyle/>
+          <a:p>
+            <a:pPr eaLnBrk="1" fontAlgn="auto" hangingPunct="1">
+              <a:spcBef>
+                <a:spcPts val="0"/>
+              </a:spcBef>
+              <a:spcAft>
+                <a:spcPts val="0"/>
+              </a:spcAft>
+              <a:defRPr/>
+            </a:pPr>
+            <a:r>
+              <a:rPr lang="en-US" sz="1200" dirty="0">
+                <a:solidFill>
+                  <a:srgbClr val="5B9CD5"/>
+                </a:solidFill>
+                <a:latin typeface="Arial" panose="020B0604020202020204" pitchFamily="34" charset="0"/>
+                <a:cs typeface="Arial" panose="020B0604020202020204" pitchFamily="34" charset="0"/>
+              </a:rPr>
+              <a:t>Private subnet</a:t>
+            </a:r>
+          </a:p>
+        </p:txBody>
+      </p:sp>
+      <p:pic>
+        <p:nvPicPr>
+          <p:cNvPr id="68" name="Graphic 67">
+            <a:extLst>
+              <a:ext uri="{FF2B5EF4-FFF2-40B4-BE49-F238E27FC236}">
+                <a16:creationId xmlns:a16="http://schemas.microsoft.com/office/drawing/2014/main" id="{C75C7DC0-1DFB-4571-84D1-0709F7AF8FCF}"/>
+              </a:ext>
+            </a:extLst>
+          </p:cNvPr>
+          <p:cNvPicPr>
+            <a:picLocks noChangeAspect="1"/>
+          </p:cNvPicPr>
+          <p:nvPr/>
+        </p:nvPicPr>
+        <p:blipFill>
+          <a:blip r:embed="rId2">
+            <a:extLst>
+              <a:ext uri="{96DAC541-7B7A-43D3-8B79-37D633B846F1}">
+                <asvg:svgBlip xmlns:asvg="http://schemas.microsoft.com/office/drawing/2016/SVG/main" r:embed="rId3"/>
+              </a:ext>
+            </a:extLst>
+          </a:blip>
+          <a:stretch>
+            <a:fillRect/>
+          </a:stretch>
+        </p:blipFill>
+        <p:spPr>
+          <a:xfrm>
+            <a:off x="6547425" y="7009148"/>
+            <a:ext cx="381000" cy="381000"/>
+          </a:xfrm>
+          <a:prstGeom prst="rect">
+            <a:avLst/>
+          </a:prstGeom>
+        </p:spPr>
+      </p:pic>
+      <p:sp>
+        <p:nvSpPr>
+          <p:cNvPr id="69" name="Rectangle 68">
+            <a:extLst>
+              <a:ext uri="{FF2B5EF4-FFF2-40B4-BE49-F238E27FC236}">
+                <a16:creationId xmlns:a16="http://schemas.microsoft.com/office/drawing/2014/main" id="{C3F5568A-2B49-43FB-BB1F-E220BD86322B}"/>
+              </a:ext>
+            </a:extLst>
+          </p:cNvPr>
+          <p:cNvSpPr/>
+          <p:nvPr/>
+        </p:nvSpPr>
+        <p:spPr>
+          <a:xfrm>
+            <a:off x="10507979" y="7019592"/>
+            <a:ext cx="2075481" cy="1463040"/>
+          </a:xfrm>
+          <a:prstGeom prst="rect">
+            <a:avLst/>
+          </a:prstGeom>
+          <a:solidFill>
+            <a:srgbClr val="007CBC">
+              <a:alpha val="9804"/>
+            </a:srgbClr>
+          </a:solidFill>
+          <a:ln w="12700">
+            <a:noFill/>
+            <a:prstDash val="dash"/>
+          </a:ln>
+        </p:spPr>
+        <p:style>
+          <a:lnRef idx="2">
+            <a:schemeClr val="accent1">
+              <a:shade val="50000"/>
+            </a:schemeClr>
+          </a:lnRef>
+          <a:fillRef idx="1">
+            <a:schemeClr val="accent1"/>
+          </a:fillRef>
+          <a:effectRef idx="0">
+            <a:schemeClr val="accent1"/>
+          </a:effectRef>
+          <a:fontRef idx="minor">
+            <a:schemeClr val="lt1"/>
+          </a:fontRef>
+        </p:style>
+        <p:txBody>
+          <a:bodyPr lIns="502920"/>
+          <a:lstStyle/>
+          <a:p>
+            <a:pPr eaLnBrk="1" fontAlgn="auto" hangingPunct="1">
+              <a:spcBef>
+                <a:spcPts val="0"/>
+              </a:spcBef>
+              <a:spcAft>
+                <a:spcPts val="0"/>
+              </a:spcAft>
+              <a:defRPr/>
+            </a:pPr>
+            <a:r>
+              <a:rPr lang="en-US" sz="1200" dirty="0">
+                <a:solidFill>
+                  <a:srgbClr val="5B9CD5"/>
+                </a:solidFill>
+                <a:latin typeface="Arial" panose="020B0604020202020204" pitchFamily="34" charset="0"/>
+                <a:cs typeface="Arial" panose="020B0604020202020204" pitchFamily="34" charset="0"/>
+              </a:rPr>
+              <a:t>Private subnet</a:t>
+            </a:r>
+          </a:p>
+        </p:txBody>
+      </p:sp>
+      <p:pic>
+        <p:nvPicPr>
+          <p:cNvPr id="70" name="Graphic 69">
+            <a:extLst>
+              <a:ext uri="{FF2B5EF4-FFF2-40B4-BE49-F238E27FC236}">
+                <a16:creationId xmlns:a16="http://schemas.microsoft.com/office/drawing/2014/main" id="{EC9F2B48-47F0-4045-9BF2-5BD758C28D67}"/>
+              </a:ext>
+            </a:extLst>
+          </p:cNvPr>
+          <p:cNvPicPr>
+            <a:picLocks noChangeAspect="1"/>
+          </p:cNvPicPr>
+          <p:nvPr/>
+        </p:nvPicPr>
+        <p:blipFill>
+          <a:blip r:embed="rId2">
+            <a:extLst>
+              <a:ext uri="{96DAC541-7B7A-43D3-8B79-37D633B846F1}">
+                <asvg:svgBlip xmlns:asvg="http://schemas.microsoft.com/office/drawing/2016/SVG/main" r:embed="rId3"/>
+              </a:ext>
+            </a:extLst>
+          </a:blip>
+          <a:stretch>
+            <a:fillRect/>
+          </a:stretch>
+        </p:blipFill>
+        <p:spPr>
+          <a:xfrm>
+            <a:off x="10507979" y="7021180"/>
+            <a:ext cx="381000" cy="381000"/>
+          </a:xfrm>
+          <a:prstGeom prst="rect">
+            <a:avLst/>
+          </a:prstGeom>
+        </p:spPr>
+      </p:pic>
+      <p:sp>
+        <p:nvSpPr>
+          <p:cNvPr id="71" name="Rectangle 70">
+            <a:extLst>
+              <a:ext uri="{FF2B5EF4-FFF2-40B4-BE49-F238E27FC236}">
+                <a16:creationId xmlns:a16="http://schemas.microsoft.com/office/drawing/2014/main" id="{1406D1B2-EDA8-4A48-89E8-E4A3A75F4718}"/>
+              </a:ext>
+            </a:extLst>
+          </p:cNvPr>
+          <p:cNvSpPr/>
+          <p:nvPr/>
+        </p:nvSpPr>
+        <p:spPr>
+          <a:xfrm>
+            <a:off x="13250973" y="7019592"/>
+            <a:ext cx="2075481" cy="1463040"/>
+          </a:xfrm>
+          <a:prstGeom prst="rect">
+            <a:avLst/>
+          </a:prstGeom>
+          <a:solidFill>
+            <a:srgbClr val="007CBC">
+              <a:alpha val="9804"/>
+            </a:srgbClr>
+          </a:solidFill>
+          <a:ln w="12700">
+            <a:noFill/>
+            <a:prstDash val="dash"/>
+          </a:ln>
+        </p:spPr>
+        <p:style>
+          <a:lnRef idx="2">
+            <a:schemeClr val="accent1">
+              <a:shade val="50000"/>
+            </a:schemeClr>
+          </a:lnRef>
+          <a:fillRef idx="1">
+            <a:schemeClr val="accent1"/>
+          </a:fillRef>
+          <a:effectRef idx="0">
+            <a:schemeClr val="accent1"/>
+          </a:effectRef>
+          <a:fontRef idx="minor">
+            <a:schemeClr val="lt1"/>
+          </a:fontRef>
+        </p:style>
+        <p:txBody>
+          <a:bodyPr lIns="502920"/>
+          <a:lstStyle/>
+          <a:p>
+            <a:pPr eaLnBrk="1" fontAlgn="auto" hangingPunct="1">
+              <a:spcBef>
+                <a:spcPts val="0"/>
+              </a:spcBef>
+              <a:spcAft>
+                <a:spcPts val="0"/>
+              </a:spcAft>
+              <a:defRPr/>
+            </a:pPr>
+            <a:r>
+              <a:rPr lang="en-US" sz="1200" dirty="0">
+                <a:solidFill>
+                  <a:srgbClr val="5B9CD5"/>
+                </a:solidFill>
+                <a:latin typeface="Arial" panose="020B0604020202020204" pitchFamily="34" charset="0"/>
+                <a:cs typeface="Arial" panose="020B0604020202020204" pitchFamily="34" charset="0"/>
+              </a:rPr>
+              <a:t>Private subnet</a:t>
+            </a:r>
+          </a:p>
+        </p:txBody>
+      </p:sp>
+      <p:pic>
+        <p:nvPicPr>
+          <p:cNvPr id="72" name="Graphic 71">
+            <a:extLst>
+              <a:ext uri="{FF2B5EF4-FFF2-40B4-BE49-F238E27FC236}">
+                <a16:creationId xmlns:a16="http://schemas.microsoft.com/office/drawing/2014/main" id="{F8A7518F-4484-41A5-927E-A03B7BA8023B}"/>
+              </a:ext>
+            </a:extLst>
+          </p:cNvPr>
+          <p:cNvPicPr>
+            <a:picLocks noChangeAspect="1"/>
+          </p:cNvPicPr>
+          <p:nvPr/>
+        </p:nvPicPr>
+        <p:blipFill>
+          <a:blip r:embed="rId2">
+            <a:extLst>
+              <a:ext uri="{96DAC541-7B7A-43D3-8B79-37D633B846F1}">
+                <asvg:svgBlip xmlns:asvg="http://schemas.microsoft.com/office/drawing/2016/SVG/main" r:embed="rId3"/>
+              </a:ext>
+            </a:extLst>
+          </a:blip>
+          <a:stretch>
+            <a:fillRect/>
+          </a:stretch>
+        </p:blipFill>
+        <p:spPr>
+          <a:xfrm>
+            <a:off x="13250973" y="7021180"/>
+            <a:ext cx="381000" cy="381000"/>
+          </a:xfrm>
+          <a:prstGeom prst="rect">
+            <a:avLst/>
+          </a:prstGeom>
+        </p:spPr>
+      </p:pic>
+      <p:sp>
+        <p:nvSpPr>
+          <p:cNvPr id="60" name="Rectangle 59">
+            <a:extLst>
+              <a:ext uri="{FF2B5EF4-FFF2-40B4-BE49-F238E27FC236}">
+                <a16:creationId xmlns:a16="http://schemas.microsoft.com/office/drawing/2014/main" id="{16313980-912B-4B66-B892-A8136BB74A82}"/>
+              </a:ext>
+            </a:extLst>
+          </p:cNvPr>
+          <p:cNvSpPr/>
+          <p:nvPr/>
+        </p:nvSpPr>
+        <p:spPr>
+          <a:xfrm>
+            <a:off x="6850380" y="7478832"/>
+            <a:ext cx="8229600" cy="914400"/>
+          </a:xfrm>
+          <a:prstGeom prst="rect">
+            <a:avLst/>
+          </a:prstGeom>
+          <a:noFill/>
+          <a:ln w="12700">
+            <a:solidFill>
+              <a:srgbClr val="D86613"/>
+            </a:solidFill>
+            <a:prstDash val="dash"/>
+          </a:ln>
+        </p:spPr>
+        <p:style>
+          <a:lnRef idx="2">
+            <a:schemeClr val="accent1">
+              <a:shade val="50000"/>
+            </a:schemeClr>
+          </a:lnRef>
+          <a:fillRef idx="1">
+            <a:schemeClr val="accent1"/>
+          </a:fillRef>
+          <a:effectRef idx="0">
+            <a:schemeClr val="accent1"/>
+          </a:effectRef>
+          <a:fontRef idx="minor">
+            <a:schemeClr val="lt1"/>
+          </a:fontRef>
+        </p:style>
+        <p:txBody>
           <a:bodyPr tIns="91440"/>
           <a:lstStyle/>
           <a:p>
@@ -3351,10 +3598,10 @@
           <p:nvPr/>
         </p:nvPicPr>
         <p:blipFill>
-          <a:blip r:embed="rId2">
+          <a:blip r:embed="rId4">
             <a:extLst>
               <a:ext uri="{96DAC541-7B7A-43D3-8B79-37D633B846F1}">
-                <asvg:svgBlip xmlns:asvg="http://schemas.microsoft.com/office/drawing/2016/SVG/main" r:embed="rId3"/>
+                <asvg:svgBlip xmlns:asvg="http://schemas.microsoft.com/office/drawing/2016/SVG/main" r:embed="rId5"/>
               </a:ext>
             </a:extLst>
           </a:blip>
@@ -3385,7 +3632,7 @@
         </p:nvSpPr>
         <p:spPr>
           <a:xfrm>
-            <a:off x="6393180" y="4023360"/>
+            <a:off x="6369116" y="4023360"/>
             <a:ext cx="2468880" cy="4815840"/>
           </a:xfrm>
           <a:prstGeom prst="rect">
@@ -3441,232 +3688,6 @@
           </a:p>
         </p:txBody>
       </p:sp>
-      <p:sp>
-        <p:nvSpPr>
-          <p:cNvPr id="11" name="Rectangle 10">
-            <a:extLst>
-              <a:ext uri="{FF2B5EF4-FFF2-40B4-BE49-F238E27FC236}">
-                <a16:creationId xmlns:a16="http://schemas.microsoft.com/office/drawing/2014/main" id="{584BC9CB-C96F-4593-A03D-6D65A299974A}"/>
-              </a:ext>
-            </a:extLst>
-          </p:cNvPr>
-          <p:cNvSpPr/>
-          <p:nvPr/>
-        </p:nvSpPr>
-        <p:spPr>
-          <a:xfrm>
-            <a:off x="6576060" y="7040880"/>
-            <a:ext cx="2103120" cy="1463040"/>
-          </a:xfrm>
-          <a:prstGeom prst="rect">
-            <a:avLst/>
-          </a:prstGeom>
-          <a:solidFill>
-            <a:srgbClr val="007CBC">
-              <a:alpha val="9804"/>
-            </a:srgbClr>
-          </a:solidFill>
-          <a:ln w="12700" cap="flat" cmpd="sng" algn="ctr">
-            <a:noFill/>
-            <a:prstDash val="dash"/>
-            <a:miter lim="800000"/>
-          </a:ln>
-          <a:effectLst/>
-        </p:spPr>
-        <p:txBody>
-          <a:bodyPr rot="0" spcFirstLastPara="0" vertOverflow="overflow" horzOverflow="overflow" vert="horz" wrap="square" lIns="338328" tIns="45720" rIns="91440" bIns="45720" numCol="1" spcCol="0" rtlCol="0" fromWordArt="0" anchor="t" anchorCtr="0" forceAA="0" compatLnSpc="1">
-            <a:prstTxWarp prst="textNoShape">
-              <a:avLst/>
-            </a:prstTxWarp>
-            <a:noAutofit/>
-          </a:bodyPr>
-          <a:lstStyle/>
-          <a:p>
-            <a:pPr marL="0" marR="0" lvl="0" indent="0" defTabSz="914400" eaLnBrk="1" fontAlgn="auto" latinLnBrk="0" hangingPunct="1">
-              <a:lnSpc>
-                <a:spcPct val="100000"/>
-              </a:lnSpc>
-              <a:spcBef>
-                <a:spcPts val="0"/>
-              </a:spcBef>
-              <a:spcAft>
-                <a:spcPts val="0"/>
-              </a:spcAft>
-              <a:buClrTx/>
-              <a:buSzTx/>
-              <a:buFontTx/>
-              <a:buNone/>
-              <a:tabLst/>
-              <a:defRPr/>
-            </a:pPr>
-            <a:r>
-              <a:rPr kumimoji="0" lang="en-US" sz="1200" b="0" i="0" u="none" strike="noStrike" kern="0" cap="none" spc="0" normalizeH="0" baseline="0" noProof="0" dirty="0">
-                <a:ln>
-                  <a:noFill/>
-                </a:ln>
-                <a:solidFill>
-                  <a:srgbClr val="007CBC"/>
-                </a:solidFill>
-                <a:effectLst/>
-                <a:uLnTx/>
-                <a:uFillTx/>
-                <a:latin typeface="Arial" panose="020B0604020202020204" pitchFamily="34" charset="0"/>
-                <a:cs typeface="Arial" panose="020B0604020202020204" pitchFamily="34" charset="0"/>
-              </a:rPr>
-              <a:t>Private subnet</a:t>
-            </a:r>
-          </a:p>
-        </p:txBody>
-      </p:sp>
-      <p:sp>
-        <p:nvSpPr>
-          <p:cNvPr id="12" name="Rectangle 11">
-            <a:extLst>
-              <a:ext uri="{FF2B5EF4-FFF2-40B4-BE49-F238E27FC236}">
-                <a16:creationId xmlns:a16="http://schemas.microsoft.com/office/drawing/2014/main" id="{991293FB-7293-45EB-9400-6C9BE6797D97}"/>
-              </a:ext>
-            </a:extLst>
-          </p:cNvPr>
-          <p:cNvSpPr/>
-          <p:nvPr/>
-        </p:nvSpPr>
-        <p:spPr>
-          <a:xfrm>
-            <a:off x="6576060" y="4572000"/>
-            <a:ext cx="2103120" cy="2286000"/>
-          </a:xfrm>
-          <a:prstGeom prst="rect">
-            <a:avLst/>
-          </a:prstGeom>
-          <a:solidFill>
-            <a:srgbClr val="1D8900">
-              <a:alpha val="9804"/>
-            </a:srgbClr>
-          </a:solidFill>
-          <a:ln w="12700" cap="flat" cmpd="sng" algn="ctr">
-            <a:noFill/>
-            <a:prstDash val="dash"/>
-            <a:miter lim="800000"/>
-          </a:ln>
-          <a:effectLst/>
-        </p:spPr>
-        <p:txBody>
-          <a:bodyPr rot="0" spcFirstLastPara="0" vertOverflow="overflow" horzOverflow="overflow" vert="horz" wrap="square" lIns="338328" tIns="45720" rIns="91440" bIns="45720" numCol="1" spcCol="0" rtlCol="0" fromWordArt="0" anchor="t" anchorCtr="0" forceAA="0" compatLnSpc="1">
-            <a:prstTxWarp prst="textNoShape">
-              <a:avLst/>
-            </a:prstTxWarp>
-            <a:noAutofit/>
-          </a:bodyPr>
-          <a:lstStyle/>
-          <a:p>
-            <a:pPr marL="0" marR="0" lvl="0" indent="0" defTabSz="914400" eaLnBrk="1" fontAlgn="auto" latinLnBrk="0" hangingPunct="1">
-              <a:lnSpc>
-                <a:spcPct val="100000"/>
-              </a:lnSpc>
-              <a:spcBef>
-                <a:spcPts val="0"/>
-              </a:spcBef>
-              <a:spcAft>
-                <a:spcPts val="0"/>
-              </a:spcAft>
-              <a:buClrTx/>
-              <a:buSzTx/>
-              <a:buFontTx/>
-              <a:buNone/>
-              <a:tabLst/>
-              <a:defRPr/>
-            </a:pPr>
-            <a:r>
-              <a:rPr kumimoji="0" lang="en-US" sz="1200" b="0" i="0" u="none" strike="noStrike" kern="0" cap="none" spc="0" normalizeH="0" baseline="0" noProof="0" dirty="0">
-                <a:ln>
-                  <a:noFill/>
-                </a:ln>
-                <a:solidFill>
-                  <a:srgbClr val="1D8900"/>
-                </a:solidFill>
-                <a:effectLst/>
-                <a:uLnTx/>
-                <a:uFillTx/>
-                <a:latin typeface="Arial" panose="020B0604020202020204" pitchFamily="34" charset="0"/>
-                <a:cs typeface="Arial" panose="020B0604020202020204" pitchFamily="34" charset="0"/>
-              </a:rPr>
-              <a:t>Public subnet</a:t>
-            </a:r>
-          </a:p>
-        </p:txBody>
-      </p:sp>
-      <p:pic>
-        <p:nvPicPr>
-          <p:cNvPr id="13" name="Graphic 10">
-            <a:extLst>
-              <a:ext uri="{FF2B5EF4-FFF2-40B4-BE49-F238E27FC236}">
-                <a16:creationId xmlns:a16="http://schemas.microsoft.com/office/drawing/2014/main" id="{6F009B28-33B1-4525-9FEA-BF7F7AEF0734}"/>
-              </a:ext>
-            </a:extLst>
-          </p:cNvPr>
-          <p:cNvPicPr>
-            <a:picLocks noChangeAspect="1"/>
-          </p:cNvPicPr>
-          <p:nvPr/>
-        </p:nvPicPr>
-        <p:blipFill>
-          <a:blip r:embed="rId4">
-            <a:extLst>
-              <a:ext uri="{96DAC541-7B7A-43D3-8B79-37D633B846F1}">
-                <asvg:svgBlip xmlns:asvg="http://schemas.microsoft.com/office/drawing/2016/SVG/main" r:embed="rId5"/>
-              </a:ext>
-            </a:extLst>
-          </a:blip>
-          <a:stretch>
-            <a:fillRect/>
-          </a:stretch>
-        </p:blipFill>
-        <p:spPr>
-          <a:xfrm>
-            <a:off x="6576060" y="4572000"/>
-            <a:ext cx="274320" cy="274320"/>
-          </a:xfrm>
-          <a:prstGeom prst="rect">
-            <a:avLst/>
-          </a:prstGeom>
-        </p:spPr>
-      </p:pic>
-      <p:pic>
-        <p:nvPicPr>
-          <p:cNvPr id="15" name="Graphic 13">
-            <a:extLst>
-              <a:ext uri="{FF2B5EF4-FFF2-40B4-BE49-F238E27FC236}">
-                <a16:creationId xmlns:a16="http://schemas.microsoft.com/office/drawing/2014/main" id="{D6E60AC6-3972-49EF-B028-38AAC997164D}"/>
-              </a:ext>
-            </a:extLst>
-          </p:cNvPr>
-          <p:cNvPicPr>
-            <a:picLocks noChangeAspect="1"/>
-          </p:cNvPicPr>
-          <p:nvPr/>
-        </p:nvPicPr>
-        <p:blipFill>
-          <a:blip r:embed="rId6">
-            <a:extLst>
-              <a:ext uri="{96DAC541-7B7A-43D3-8B79-37D633B846F1}">
-                <asvg:svgBlip xmlns:asvg="http://schemas.microsoft.com/office/drawing/2016/SVG/main" r:embed="rId7"/>
-              </a:ext>
-            </a:extLst>
-          </a:blip>
-          <a:stretch>
-            <a:fillRect/>
-          </a:stretch>
-        </p:blipFill>
-        <p:spPr>
-          <a:xfrm>
-            <a:off x="6576060" y="7040880"/>
-            <a:ext cx="274320" cy="274320"/>
-          </a:xfrm>
-          <a:prstGeom prst="rect">
-            <a:avLst/>
-          </a:prstGeom>
-        </p:spPr>
-      </p:pic>
       <p:pic>
         <p:nvPicPr>
           <p:cNvPr id="16" name="Graphic 62">
@@ -3682,7 +3703,7 @@
           <p:nvPr/>
         </p:nvPicPr>
         <p:blipFill>
-          <a:blip r:embed="rId8" cstate="print">
+          <a:blip r:embed="rId6" cstate="print">
             <a:extLst>
               <a:ext uri="{28A0092B-C50C-407E-A947-70E740481C1C}">
                 <a14:useLocalDpi xmlns:a14="http://schemas.microsoft.com/office/drawing/2010/main" val="0"/>
@@ -3696,7 +3717,7 @@
         </p:blipFill>
         <p:spPr bwMode="auto">
           <a:xfrm>
-            <a:off x="7399020" y="7498080"/>
+            <a:off x="7374956" y="7594336"/>
             <a:ext cx="457200" cy="457200"/>
           </a:xfrm>
           <a:prstGeom prst="rect">
@@ -3741,7 +3762,7 @@
         </p:nvSpPr>
         <p:spPr>
           <a:xfrm>
-            <a:off x="7080298" y="6312199"/>
+            <a:off x="7056234" y="6312199"/>
             <a:ext cx="1097280" cy="261610"/>
           </a:xfrm>
           <a:prstGeom prst="rect">
@@ -3785,7 +3806,7 @@
         </p:nvSpPr>
         <p:spPr bwMode="auto">
           <a:xfrm>
-            <a:off x="7079350" y="5397800"/>
+            <a:off x="7055286" y="5397800"/>
             <a:ext cx="1097280" cy="261610"/>
           </a:xfrm>
           <a:prstGeom prst="rect">
@@ -3945,7 +3966,7 @@
           <p:nvPr/>
         </p:nvPicPr>
         <p:blipFill>
-          <a:blip r:embed="rId9" cstate="print">
+          <a:blip r:embed="rId7" cstate="print">
             <a:extLst>
               <a:ext uri="{28A0092B-C50C-407E-A947-70E740481C1C}">
                 <a14:useLocalDpi xmlns:a14="http://schemas.microsoft.com/office/drawing/2010/main" val="0"/>
@@ -3959,7 +3980,7 @@
         </p:blipFill>
         <p:spPr bwMode="auto">
           <a:xfrm>
-            <a:off x="7399020" y="4937760"/>
+            <a:off x="7374956" y="4937760"/>
             <a:ext cx="457200" cy="457200"/>
           </a:xfrm>
           <a:prstGeom prst="rect">
@@ -4006,7 +4027,7 @@
         </p:nvSpPr>
         <p:spPr bwMode="auto">
           <a:xfrm>
-            <a:off x="6897166" y="7956317"/>
+            <a:off x="6873102" y="8052573"/>
             <a:ext cx="1463040" cy="261610"/>
           </a:xfrm>
           <a:prstGeom prst="rect">
@@ -4971,7 +4992,7 @@
           <p:nvPr/>
         </p:nvPicPr>
         <p:blipFill>
-          <a:blip r:embed="rId10">
+          <a:blip r:embed="rId8">
             <a:extLst>
               <a:ext uri="{28A0092B-C50C-407E-A947-70E740481C1C}">
                 <a14:useLocalDpi xmlns:a14="http://schemas.microsoft.com/office/drawing/2010/main" val="0"/>
@@ -4985,7 +5006,7 @@
         </p:blipFill>
         <p:spPr bwMode="auto">
           <a:xfrm>
-            <a:off x="7399020" y="5852160"/>
+            <a:off x="7374956" y="5852160"/>
             <a:ext cx="457200" cy="457200"/>
           </a:xfrm>
           <a:prstGeom prst="rect">
@@ -5031,10 +5052,10 @@
           <p:nvPr/>
         </p:nvPicPr>
         <p:blipFill>
-          <a:blip r:embed="rId11">
+          <a:blip r:embed="rId9">
             <a:extLst>
               <a:ext uri="{96DAC541-7B7A-43D3-8B79-37D633B846F1}">
-                <asvg:svgBlip xmlns:asvg="http://schemas.microsoft.com/office/drawing/2016/SVG/main" r:embed="rId12"/>
+                <asvg:svgBlip xmlns:asvg="http://schemas.microsoft.com/office/drawing/2016/SVG/main" r:embed="rId10"/>
               </a:ext>
             </a:extLst>
           </a:blip>
@@ -5067,10 +5088,10 @@
           <p:nvPr/>
         </p:nvPicPr>
         <p:blipFill>
-          <a:blip r:embed="rId11">
+          <a:blip r:embed="rId9">
             <a:extLst>
               <a:ext uri="{96DAC541-7B7A-43D3-8B79-37D633B846F1}">
-                <asvg:svgBlip xmlns:asvg="http://schemas.microsoft.com/office/drawing/2016/SVG/main" r:embed="rId12"/>
+                <asvg:svgBlip xmlns:asvg="http://schemas.microsoft.com/office/drawing/2016/SVG/main" r:embed="rId10"/>
               </a:ext>
             </a:extLst>
           </a:blip>
@@ -5080,7 +5101,7 @@
         </p:blipFill>
         <p:spPr>
           <a:xfrm>
-            <a:off x="9410700" y="7406640"/>
+            <a:off x="9410700" y="7478832"/>
             <a:ext cx="381000" cy="381000"/>
           </a:xfrm>
           <a:prstGeom prst="rect">
@@ -5175,232 +5196,6 @@
           </a:p>
         </p:txBody>
       </p:sp>
-      <p:sp>
-        <p:nvSpPr>
-          <p:cNvPr id="85" name="Rectangle 84">
-            <a:extLst>
-              <a:ext uri="{FF2B5EF4-FFF2-40B4-BE49-F238E27FC236}">
-                <a16:creationId xmlns:a16="http://schemas.microsoft.com/office/drawing/2014/main" id="{0F1FC343-DBE8-4D00-989A-6C6D0C23A70B}"/>
-              </a:ext>
-            </a:extLst>
-          </p:cNvPr>
-          <p:cNvSpPr/>
-          <p:nvPr/>
-        </p:nvSpPr>
-        <p:spPr>
-          <a:xfrm>
-            <a:off x="10480341" y="7040880"/>
-            <a:ext cx="2103120" cy="1463040"/>
-          </a:xfrm>
-          <a:prstGeom prst="rect">
-            <a:avLst/>
-          </a:prstGeom>
-          <a:solidFill>
-            <a:srgbClr val="007CBC">
-              <a:alpha val="9804"/>
-            </a:srgbClr>
-          </a:solidFill>
-          <a:ln w="12700" cap="flat" cmpd="sng" algn="ctr">
-            <a:noFill/>
-            <a:prstDash val="dash"/>
-            <a:miter lim="800000"/>
-          </a:ln>
-          <a:effectLst/>
-        </p:spPr>
-        <p:txBody>
-          <a:bodyPr rot="0" spcFirstLastPara="0" vertOverflow="overflow" horzOverflow="overflow" vert="horz" wrap="square" lIns="338328" tIns="45720" rIns="91440" bIns="45720" numCol="1" spcCol="0" rtlCol="0" fromWordArt="0" anchor="t" anchorCtr="0" forceAA="0" compatLnSpc="1">
-            <a:prstTxWarp prst="textNoShape">
-              <a:avLst/>
-            </a:prstTxWarp>
-            <a:noAutofit/>
-          </a:bodyPr>
-          <a:lstStyle/>
-          <a:p>
-            <a:pPr marL="0" marR="0" lvl="0" indent="0" defTabSz="914400" eaLnBrk="1" fontAlgn="auto" latinLnBrk="0" hangingPunct="1">
-              <a:lnSpc>
-                <a:spcPct val="100000"/>
-              </a:lnSpc>
-              <a:spcBef>
-                <a:spcPts val="0"/>
-              </a:spcBef>
-              <a:spcAft>
-                <a:spcPts val="0"/>
-              </a:spcAft>
-              <a:buClrTx/>
-              <a:buSzTx/>
-              <a:buFontTx/>
-              <a:buNone/>
-              <a:tabLst/>
-              <a:defRPr/>
-            </a:pPr>
-            <a:r>
-              <a:rPr kumimoji="0" lang="en-US" sz="1200" b="0" i="0" u="none" strike="noStrike" kern="0" cap="none" spc="0" normalizeH="0" baseline="0" noProof="0" dirty="0">
-                <a:ln>
-                  <a:noFill/>
-                </a:ln>
-                <a:solidFill>
-                  <a:srgbClr val="007CBC"/>
-                </a:solidFill>
-                <a:effectLst/>
-                <a:uLnTx/>
-                <a:uFillTx/>
-                <a:latin typeface="Arial" panose="020B0604020202020204" pitchFamily="34" charset="0"/>
-                <a:cs typeface="Arial" panose="020B0604020202020204" pitchFamily="34" charset="0"/>
-              </a:rPr>
-              <a:t>Private subnet</a:t>
-            </a:r>
-          </a:p>
-        </p:txBody>
-      </p:sp>
-      <p:sp>
-        <p:nvSpPr>
-          <p:cNvPr id="86" name="Rectangle 85">
-            <a:extLst>
-              <a:ext uri="{FF2B5EF4-FFF2-40B4-BE49-F238E27FC236}">
-                <a16:creationId xmlns:a16="http://schemas.microsoft.com/office/drawing/2014/main" id="{D05CBFF4-466C-496D-9FAF-CC38C79AD777}"/>
-              </a:ext>
-            </a:extLst>
-          </p:cNvPr>
-          <p:cNvSpPr/>
-          <p:nvPr/>
-        </p:nvSpPr>
-        <p:spPr>
-          <a:xfrm>
-            <a:off x="10507980" y="4572000"/>
-            <a:ext cx="2103120" cy="2286000"/>
-          </a:xfrm>
-          <a:prstGeom prst="rect">
-            <a:avLst/>
-          </a:prstGeom>
-          <a:solidFill>
-            <a:srgbClr val="1D8900">
-              <a:alpha val="9804"/>
-            </a:srgbClr>
-          </a:solidFill>
-          <a:ln w="12700" cap="flat" cmpd="sng" algn="ctr">
-            <a:noFill/>
-            <a:prstDash val="dash"/>
-            <a:miter lim="800000"/>
-          </a:ln>
-          <a:effectLst/>
-        </p:spPr>
-        <p:txBody>
-          <a:bodyPr rot="0" spcFirstLastPara="0" vertOverflow="overflow" horzOverflow="overflow" vert="horz" wrap="square" lIns="338328" tIns="45720" rIns="91440" bIns="45720" numCol="1" spcCol="0" rtlCol="0" fromWordArt="0" anchor="t" anchorCtr="0" forceAA="0" compatLnSpc="1">
-            <a:prstTxWarp prst="textNoShape">
-              <a:avLst/>
-            </a:prstTxWarp>
-            <a:noAutofit/>
-          </a:bodyPr>
-          <a:lstStyle/>
-          <a:p>
-            <a:pPr marL="0" marR="0" lvl="0" indent="0" defTabSz="914400" eaLnBrk="1" fontAlgn="auto" latinLnBrk="0" hangingPunct="1">
-              <a:lnSpc>
-                <a:spcPct val="100000"/>
-              </a:lnSpc>
-              <a:spcBef>
-                <a:spcPts val="0"/>
-              </a:spcBef>
-              <a:spcAft>
-                <a:spcPts val="0"/>
-              </a:spcAft>
-              <a:buClrTx/>
-              <a:buSzTx/>
-              <a:buFontTx/>
-              <a:buNone/>
-              <a:tabLst/>
-              <a:defRPr/>
-            </a:pPr>
-            <a:r>
-              <a:rPr kumimoji="0" lang="en-US" sz="1200" b="0" i="0" u="none" strike="noStrike" kern="0" cap="none" spc="0" normalizeH="0" baseline="0" noProof="0" dirty="0">
-                <a:ln>
-                  <a:noFill/>
-                </a:ln>
-                <a:solidFill>
-                  <a:srgbClr val="1D8900"/>
-                </a:solidFill>
-                <a:effectLst/>
-                <a:uLnTx/>
-                <a:uFillTx/>
-                <a:latin typeface="Arial" panose="020B0604020202020204" pitchFamily="34" charset="0"/>
-                <a:cs typeface="Arial" panose="020B0604020202020204" pitchFamily="34" charset="0"/>
-              </a:rPr>
-              <a:t>Public subnet</a:t>
-            </a:r>
-          </a:p>
-        </p:txBody>
-      </p:sp>
-      <p:pic>
-        <p:nvPicPr>
-          <p:cNvPr id="87" name="Graphic 10">
-            <a:extLst>
-              <a:ext uri="{FF2B5EF4-FFF2-40B4-BE49-F238E27FC236}">
-                <a16:creationId xmlns:a16="http://schemas.microsoft.com/office/drawing/2014/main" id="{C70B8DCD-94D4-4667-9B38-E48AC83ACE15}"/>
-              </a:ext>
-            </a:extLst>
-          </p:cNvPr>
-          <p:cNvPicPr>
-            <a:picLocks noChangeAspect="1"/>
-          </p:cNvPicPr>
-          <p:nvPr/>
-        </p:nvPicPr>
-        <p:blipFill>
-          <a:blip r:embed="rId4">
-            <a:extLst>
-              <a:ext uri="{96DAC541-7B7A-43D3-8B79-37D633B846F1}">
-                <asvg:svgBlip xmlns:asvg="http://schemas.microsoft.com/office/drawing/2016/SVG/main" r:embed="rId5"/>
-              </a:ext>
-            </a:extLst>
-          </a:blip>
-          <a:stretch>
-            <a:fillRect/>
-          </a:stretch>
-        </p:blipFill>
-        <p:spPr>
-          <a:xfrm>
-            <a:off x="10507980" y="4572000"/>
-            <a:ext cx="274320" cy="274320"/>
-          </a:xfrm>
-          <a:prstGeom prst="rect">
-            <a:avLst/>
-          </a:prstGeom>
-        </p:spPr>
-      </p:pic>
-      <p:pic>
-        <p:nvPicPr>
-          <p:cNvPr id="88" name="Graphic 13">
-            <a:extLst>
-              <a:ext uri="{FF2B5EF4-FFF2-40B4-BE49-F238E27FC236}">
-                <a16:creationId xmlns:a16="http://schemas.microsoft.com/office/drawing/2014/main" id="{1CD9B340-ED1C-4DC4-BBC7-01C170E48A1E}"/>
-              </a:ext>
-            </a:extLst>
-          </p:cNvPr>
-          <p:cNvPicPr>
-            <a:picLocks noChangeAspect="1"/>
-          </p:cNvPicPr>
-          <p:nvPr/>
-        </p:nvPicPr>
-        <p:blipFill>
-          <a:blip r:embed="rId6">
-            <a:extLst>
-              <a:ext uri="{96DAC541-7B7A-43D3-8B79-37D633B846F1}">
-                <asvg:svgBlip xmlns:asvg="http://schemas.microsoft.com/office/drawing/2016/SVG/main" r:embed="rId7"/>
-              </a:ext>
-            </a:extLst>
-          </a:blip>
-          <a:stretch>
-            <a:fillRect/>
-          </a:stretch>
-        </p:blipFill>
-        <p:spPr>
-          <a:xfrm>
-            <a:off x="10480341" y="7040880"/>
-            <a:ext cx="274320" cy="274320"/>
-          </a:xfrm>
-          <a:prstGeom prst="rect">
-            <a:avLst/>
-          </a:prstGeom>
-        </p:spPr>
-      </p:pic>
       <p:pic>
         <p:nvPicPr>
           <p:cNvPr id="89" name="Graphic 62">
@@ -5416,7 +5211,7 @@
           <p:nvPr/>
         </p:nvPicPr>
         <p:blipFill>
-          <a:blip r:embed="rId8" cstate="print">
+          <a:blip r:embed="rId6" cstate="print">
             <a:extLst>
               <a:ext uri="{28A0092B-C50C-407E-A947-70E740481C1C}">
                 <a14:useLocalDpi xmlns:a14="http://schemas.microsoft.com/office/drawing/2010/main" val="0"/>
@@ -5430,7 +5225,7 @@
         </p:blipFill>
         <p:spPr bwMode="auto">
           <a:xfrm>
-            <a:off x="11330940" y="7498080"/>
+            <a:off x="11330940" y="7594336"/>
             <a:ext cx="457200" cy="457200"/>
           </a:xfrm>
           <a:prstGeom prst="rect">
@@ -5679,7 +5474,7 @@
           <p:nvPr/>
         </p:nvPicPr>
         <p:blipFill>
-          <a:blip r:embed="rId9" cstate="print">
+          <a:blip r:embed="rId7" cstate="print">
             <a:extLst>
               <a:ext uri="{28A0092B-C50C-407E-A947-70E740481C1C}">
                 <a14:useLocalDpi xmlns:a14="http://schemas.microsoft.com/office/drawing/2010/main" val="0"/>
@@ -5740,7 +5535,7 @@
         </p:nvSpPr>
         <p:spPr bwMode="auto">
           <a:xfrm>
-            <a:off x="10828117" y="7956317"/>
+            <a:off x="10828117" y="8052573"/>
             <a:ext cx="1463040" cy="261610"/>
           </a:xfrm>
           <a:prstGeom prst="rect">
@@ -5900,11 +5695,11 @@
           <p:nvPr/>
         </p:nvPicPr>
         <p:blipFill>
-          <a:blip r:embed="rId13">
+          <a:blip r:embed="rId11">
             <a:extLst>
               <a:ext uri="{BEBA8EAE-BF5A-486C-A8C5-ECC9F3942E4B}">
                 <a14:imgProps xmlns:a14="http://schemas.microsoft.com/office/drawing/2010/main">
-                  <a14:imgLayer r:embed="rId14">
+                  <a14:imgLayer r:embed="rId12">
                     <a14:imgEffect>
                       <a14:artisticBlur/>
                     </a14:imgEffect>
@@ -6024,155 +5819,6 @@
           </a:p>
         </p:txBody>
       </p:sp>
-      <p:sp>
-        <p:nvSpPr>
-          <p:cNvPr id="97" name="Rectangle 96">
-            <a:extLst>
-              <a:ext uri="{FF2B5EF4-FFF2-40B4-BE49-F238E27FC236}">
-                <a16:creationId xmlns:a16="http://schemas.microsoft.com/office/drawing/2014/main" id="{79BF5C0A-6E4F-41EF-A3E6-647A3D997054}"/>
-              </a:ext>
-            </a:extLst>
-          </p:cNvPr>
-          <p:cNvSpPr/>
-          <p:nvPr/>
-        </p:nvSpPr>
-        <p:spPr>
-          <a:xfrm>
-            <a:off x="13251180" y="4572000"/>
-            <a:ext cx="2103120" cy="2286000"/>
-          </a:xfrm>
-          <a:prstGeom prst="rect">
-            <a:avLst/>
-          </a:prstGeom>
-          <a:solidFill>
-            <a:srgbClr val="1D8900">
-              <a:alpha val="9804"/>
-            </a:srgbClr>
-          </a:solidFill>
-          <a:ln w="12700" cap="flat" cmpd="sng" algn="ctr">
-            <a:noFill/>
-            <a:prstDash val="dash"/>
-            <a:miter lim="800000"/>
-          </a:ln>
-          <a:effectLst/>
-        </p:spPr>
-        <p:txBody>
-          <a:bodyPr rot="0" spcFirstLastPara="0" vertOverflow="overflow" horzOverflow="overflow" vert="horz" wrap="square" lIns="338328" tIns="45720" rIns="91440" bIns="45720" numCol="1" spcCol="0" rtlCol="0" fromWordArt="0" anchor="t" anchorCtr="0" forceAA="0" compatLnSpc="1">
-            <a:prstTxWarp prst="textNoShape">
-              <a:avLst/>
-            </a:prstTxWarp>
-            <a:noAutofit/>
-          </a:bodyPr>
-          <a:lstStyle/>
-          <a:p>
-            <a:pPr marL="0" marR="0" lvl="0" indent="0" defTabSz="914400" eaLnBrk="1" fontAlgn="auto" latinLnBrk="0" hangingPunct="1">
-              <a:lnSpc>
-                <a:spcPct val="100000"/>
-              </a:lnSpc>
-              <a:spcBef>
-                <a:spcPts val="0"/>
-              </a:spcBef>
-              <a:spcAft>
-                <a:spcPts val="0"/>
-              </a:spcAft>
-              <a:buClrTx/>
-              <a:buSzTx/>
-              <a:buFontTx/>
-              <a:buNone/>
-              <a:tabLst/>
-              <a:defRPr/>
-            </a:pPr>
-            <a:r>
-              <a:rPr kumimoji="0" lang="en-US" sz="1200" b="0" i="0" u="none" strike="noStrike" kern="0" cap="none" spc="0" normalizeH="0" baseline="0" noProof="0" dirty="0">
-                <a:ln>
-                  <a:noFill/>
-                </a:ln>
-                <a:solidFill>
-                  <a:srgbClr val="1D8900"/>
-                </a:solidFill>
-                <a:effectLst/>
-                <a:uLnTx/>
-                <a:uFillTx/>
-                <a:latin typeface="Arial" panose="020B0604020202020204" pitchFamily="34" charset="0"/>
-                <a:cs typeface="Arial" panose="020B0604020202020204" pitchFamily="34" charset="0"/>
-              </a:rPr>
-              <a:t>Public subnet</a:t>
-            </a:r>
-          </a:p>
-        </p:txBody>
-      </p:sp>
-      <p:pic>
-        <p:nvPicPr>
-          <p:cNvPr id="98" name="Graphic 10">
-            <a:extLst>
-              <a:ext uri="{FF2B5EF4-FFF2-40B4-BE49-F238E27FC236}">
-                <a16:creationId xmlns:a16="http://schemas.microsoft.com/office/drawing/2014/main" id="{CB59F79C-11B6-4962-A6A4-FBC4BD8A4ADE}"/>
-              </a:ext>
-            </a:extLst>
-          </p:cNvPr>
-          <p:cNvPicPr>
-            <a:picLocks noChangeAspect="1"/>
-          </p:cNvPicPr>
-          <p:nvPr/>
-        </p:nvPicPr>
-        <p:blipFill>
-          <a:blip r:embed="rId4">
-            <a:extLst>
-              <a:ext uri="{96DAC541-7B7A-43D3-8B79-37D633B846F1}">
-                <asvg:svgBlip xmlns:asvg="http://schemas.microsoft.com/office/drawing/2016/SVG/main" r:embed="rId5"/>
-              </a:ext>
-            </a:extLst>
-          </a:blip>
-          <a:stretch>
-            <a:fillRect/>
-          </a:stretch>
-        </p:blipFill>
-        <p:spPr>
-          <a:xfrm>
-            <a:off x="13251180" y="4572000"/>
-            <a:ext cx="274320" cy="274320"/>
-          </a:xfrm>
-          <a:prstGeom prst="rect">
-            <a:avLst/>
-          </a:prstGeom>
-        </p:spPr>
-      </p:pic>
-      <p:pic>
-        <p:nvPicPr>
-          <p:cNvPr id="99" name="Graphic 13">
-            <a:extLst>
-              <a:ext uri="{FF2B5EF4-FFF2-40B4-BE49-F238E27FC236}">
-                <a16:creationId xmlns:a16="http://schemas.microsoft.com/office/drawing/2014/main" id="{A3B78C29-AB97-4D1C-B2D8-28A0CEF697EA}"/>
-              </a:ext>
-            </a:extLst>
-          </p:cNvPr>
-          <p:cNvPicPr>
-            <a:picLocks noChangeAspect="1"/>
-          </p:cNvPicPr>
-          <p:nvPr/>
-        </p:nvPicPr>
-        <p:blipFill>
-          <a:blip r:embed="rId6">
-            <a:extLst>
-              <a:ext uri="{96DAC541-7B7A-43D3-8B79-37D633B846F1}">
-                <asvg:svgBlip xmlns:asvg="http://schemas.microsoft.com/office/drawing/2016/SVG/main" r:embed="rId7"/>
-              </a:ext>
-            </a:extLst>
-          </a:blip>
-          <a:stretch>
-            <a:fillRect/>
-          </a:stretch>
-        </p:blipFill>
-        <p:spPr>
-          <a:xfrm>
-            <a:off x="13251180" y="7040880"/>
-            <a:ext cx="274320" cy="274320"/>
-          </a:xfrm>
-          <a:prstGeom prst="rect">
-            <a:avLst/>
-          </a:prstGeom>
-        </p:spPr>
-      </p:pic>
       <p:pic>
         <p:nvPicPr>
           <p:cNvPr id="100" name="Graphic 62">
@@ -6188,7 +5834,7 @@
           <p:nvPr/>
         </p:nvPicPr>
         <p:blipFill>
-          <a:blip r:embed="rId8" cstate="print">
+          <a:blip r:embed="rId6" cstate="print">
             <a:extLst>
               <a:ext uri="{28A0092B-C50C-407E-A947-70E740481C1C}">
                 <a14:useLocalDpi xmlns:a14="http://schemas.microsoft.com/office/drawing/2010/main" val="0"/>
@@ -6202,7 +5848,7 @@
         </p:blipFill>
         <p:spPr bwMode="auto">
           <a:xfrm>
-            <a:off x="14074140" y="7498080"/>
+            <a:off x="14074140" y="7594336"/>
             <a:ext cx="457200" cy="457200"/>
           </a:xfrm>
           <a:prstGeom prst="rect">
@@ -6451,7 +6097,7 @@
           <p:nvPr/>
         </p:nvPicPr>
         <p:blipFill>
-          <a:blip r:embed="rId9" cstate="print">
+          <a:blip r:embed="rId7" cstate="print">
             <a:extLst>
               <a:ext uri="{28A0092B-C50C-407E-A947-70E740481C1C}">
                 <a14:useLocalDpi xmlns:a14="http://schemas.microsoft.com/office/drawing/2010/main" val="0"/>
@@ -6512,7 +6158,7 @@
         </p:nvSpPr>
         <p:spPr bwMode="auto">
           <a:xfrm>
-            <a:off x="13572253" y="7956317"/>
+            <a:off x="13572253" y="8052573"/>
             <a:ext cx="1463040" cy="261610"/>
           </a:xfrm>
           <a:prstGeom prst="rect">
@@ -6672,11 +6318,11 @@
           <p:nvPr/>
         </p:nvPicPr>
         <p:blipFill>
-          <a:blip r:embed="rId13">
+          <a:blip r:embed="rId11">
             <a:extLst>
               <a:ext uri="{BEBA8EAE-BF5A-486C-A8C5-ECC9F3942E4B}">
                 <a14:imgProps xmlns:a14="http://schemas.microsoft.com/office/drawing/2010/main">
-                  <a14:imgLayer r:embed="rId14">
+                  <a14:imgLayer r:embed="rId12">
                     <a14:imgEffect>
                       <a14:artisticBlur/>
                     </a14:imgEffect>
@@ -6741,7 +6387,7 @@
           <p:nvPr/>
         </p:nvPicPr>
         <p:blipFill>
-          <a:blip r:embed="rId15"/>
+          <a:blip r:embed="rId13"/>
           <a:srcRect/>
           <a:stretch/>
         </p:blipFill>
@@ -6784,6 +6430,126 @@
             <a:extLst>
               <a:ext uri="{FF2B5EF4-FFF2-40B4-BE49-F238E27FC236}">
                 <a16:creationId xmlns:a16="http://schemas.microsoft.com/office/drawing/2014/main" id="{C6AE94D9-8FC3-4CC3-BEC1-D8868CDAF30B}"/>
+              </a:ext>
+            </a:extLst>
+          </p:cNvPr>
+          <p:cNvPicPr>
+            <a:picLocks noChangeAspect="1" noChangeArrowheads="1"/>
+          </p:cNvPicPr>
+          <p:nvPr/>
+        </p:nvPicPr>
+        <p:blipFill>
+          <a:blip r:embed="rId14">
+            <a:extLst>
+              <a:ext uri="{28A0092B-C50C-407E-A947-70E740481C1C}">
+                <a14:useLocalDpi xmlns:a14="http://schemas.microsoft.com/office/drawing/2010/main" val="0"/>
+              </a:ext>
+            </a:extLst>
+          </a:blip>
+          <a:srcRect/>
+          <a:stretch>
+            <a:fillRect/>
+          </a:stretch>
+        </p:blipFill>
+        <p:spPr bwMode="auto">
+          <a:xfrm>
+            <a:off x="8834083" y="9102477"/>
+            <a:ext cx="762000" cy="762000"/>
+          </a:xfrm>
+          <a:prstGeom prst="rect">
+            <a:avLst/>
+          </a:prstGeom>
+          <a:noFill/>
+          <a:ln>
+            <a:noFill/>
+          </a:ln>
+          <a:extLst>
+            <a:ext uri="{909E8E84-426E-40DD-AFC4-6F175D3DCCD1}">
+              <a14:hiddenFill xmlns:a14="http://schemas.microsoft.com/office/drawing/2010/main">
+                <a:solidFill>
+                  <a:srgbClr val="FFFFFF"/>
+                </a:solidFill>
+              </a14:hiddenFill>
+            </a:ext>
+            <a:ext uri="{91240B29-F687-4F45-9708-019B960494DF}">
+              <a14:hiddenLine xmlns:a14="http://schemas.microsoft.com/office/drawing/2010/main" w="9525">
+                <a:solidFill>
+                  <a:srgbClr val="000000"/>
+                </a:solidFill>
+                <a:miter lim="800000"/>
+                <a:headEnd/>
+                <a:tailEnd/>
+              </a14:hiddenLine>
+            </a:ext>
+          </a:extLst>
+        </p:spPr>
+      </p:pic>
+      <p:pic>
+        <p:nvPicPr>
+          <p:cNvPr id="57" name="Graphic 17">
+            <a:extLst>
+              <a:ext uri="{FF2B5EF4-FFF2-40B4-BE49-F238E27FC236}">
+                <a16:creationId xmlns:a16="http://schemas.microsoft.com/office/drawing/2014/main" id="{0F0098D1-7284-4423-A181-2CFF8FF95B0F}"/>
+              </a:ext>
+            </a:extLst>
+          </p:cNvPr>
+          <p:cNvPicPr>
+            <a:picLocks noChangeAspect="1" noChangeArrowheads="1"/>
+          </p:cNvPicPr>
+          <p:nvPr/>
+        </p:nvPicPr>
+        <p:blipFill>
+          <a:blip r:embed="rId15">
+            <a:extLst>
+              <a:ext uri="{28A0092B-C50C-407E-A947-70E740481C1C}">
+                <a14:useLocalDpi xmlns:a14="http://schemas.microsoft.com/office/drawing/2010/main" val="0"/>
+              </a:ext>
+            </a:extLst>
+          </a:blip>
+          <a:srcRect/>
+          <a:stretch>
+            <a:fillRect/>
+          </a:stretch>
+        </p:blipFill>
+        <p:spPr bwMode="auto">
+          <a:xfrm>
+            <a:off x="10565227" y="9102477"/>
+            <a:ext cx="762000" cy="762000"/>
+          </a:xfrm>
+          <a:prstGeom prst="rect">
+            <a:avLst/>
+          </a:prstGeom>
+          <a:noFill/>
+          <a:ln>
+            <a:noFill/>
+          </a:ln>
+          <a:extLst>
+            <a:ext uri="{909E8E84-426E-40DD-AFC4-6F175D3DCCD1}">
+              <a14:hiddenFill xmlns:a14="http://schemas.microsoft.com/office/drawing/2010/main">
+                <a:solidFill>
+                  <a:srgbClr val="FFFFFF"/>
+                </a:solidFill>
+              </a14:hiddenFill>
+            </a:ext>
+            <a:ext uri="{91240B29-F687-4F45-9708-019B960494DF}">
+              <a14:hiddenLine xmlns:a14="http://schemas.microsoft.com/office/drawing/2010/main" w="9525">
+                <a:solidFill>
+                  <a:srgbClr val="000000"/>
+                </a:solidFill>
+                <a:miter lim="800000"/>
+                <a:headEnd/>
+                <a:tailEnd/>
+              </a14:hiddenLine>
+            </a:ext>
+          </a:extLst>
+        </p:spPr>
+      </p:pic>
+      <p:pic>
+        <p:nvPicPr>
+          <p:cNvPr id="62" name="Graphic 6">
+            <a:extLst>
+              <a:ext uri="{FF2B5EF4-FFF2-40B4-BE49-F238E27FC236}">
+                <a16:creationId xmlns:a16="http://schemas.microsoft.com/office/drawing/2014/main" id="{ECFF1106-CBAA-45E0-9A94-FC620828373A}"/>
               </a:ext>
             </a:extLst>
           </p:cNvPr>
@@ -6807,7 +6573,7 @@
         </p:blipFill>
         <p:spPr bwMode="auto">
           <a:xfrm>
-            <a:off x="8834083" y="9102477"/>
+            <a:off x="12308563" y="9102477"/>
             <a:ext cx="762000" cy="762000"/>
           </a:xfrm>
           <a:prstGeom prst="rect">
@@ -6840,10 +6606,10 @@
       </p:pic>
       <p:pic>
         <p:nvPicPr>
-          <p:cNvPr id="57" name="Graphic 17">
+          <p:cNvPr id="63" name="Graphic 21">
             <a:extLst>
               <a:ext uri="{FF2B5EF4-FFF2-40B4-BE49-F238E27FC236}">
-                <a16:creationId xmlns:a16="http://schemas.microsoft.com/office/drawing/2014/main" id="{0F0098D1-7284-4423-A181-2CFF8FF95B0F}"/>
+                <a16:creationId xmlns:a16="http://schemas.microsoft.com/office/drawing/2014/main" id="{42B75D60-C1A5-4DC5-8A46-B143144EAF10}"/>
               </a:ext>
             </a:extLst>
           </p:cNvPr>
@@ -6854,126 +6620,6 @@
         </p:nvPicPr>
         <p:blipFill>
           <a:blip r:embed="rId17">
-            <a:extLst>
-              <a:ext uri="{28A0092B-C50C-407E-A947-70E740481C1C}">
-                <a14:useLocalDpi xmlns:a14="http://schemas.microsoft.com/office/drawing/2010/main" val="0"/>
-              </a:ext>
-            </a:extLst>
-          </a:blip>
-          <a:srcRect/>
-          <a:stretch>
-            <a:fillRect/>
-          </a:stretch>
-        </p:blipFill>
-        <p:spPr bwMode="auto">
-          <a:xfrm>
-            <a:off x="10565227" y="9102477"/>
-            <a:ext cx="762000" cy="762000"/>
-          </a:xfrm>
-          <a:prstGeom prst="rect">
-            <a:avLst/>
-          </a:prstGeom>
-          <a:noFill/>
-          <a:ln>
-            <a:noFill/>
-          </a:ln>
-          <a:extLst>
-            <a:ext uri="{909E8E84-426E-40DD-AFC4-6F175D3DCCD1}">
-              <a14:hiddenFill xmlns:a14="http://schemas.microsoft.com/office/drawing/2010/main">
-                <a:solidFill>
-                  <a:srgbClr val="FFFFFF"/>
-                </a:solidFill>
-              </a14:hiddenFill>
-            </a:ext>
-            <a:ext uri="{91240B29-F687-4F45-9708-019B960494DF}">
-              <a14:hiddenLine xmlns:a14="http://schemas.microsoft.com/office/drawing/2010/main" w="9525">
-                <a:solidFill>
-                  <a:srgbClr val="000000"/>
-                </a:solidFill>
-                <a:miter lim="800000"/>
-                <a:headEnd/>
-                <a:tailEnd/>
-              </a14:hiddenLine>
-            </a:ext>
-          </a:extLst>
-        </p:spPr>
-      </p:pic>
-      <p:pic>
-        <p:nvPicPr>
-          <p:cNvPr id="62" name="Graphic 6">
-            <a:extLst>
-              <a:ext uri="{FF2B5EF4-FFF2-40B4-BE49-F238E27FC236}">
-                <a16:creationId xmlns:a16="http://schemas.microsoft.com/office/drawing/2014/main" id="{ECFF1106-CBAA-45E0-9A94-FC620828373A}"/>
-              </a:ext>
-            </a:extLst>
-          </p:cNvPr>
-          <p:cNvPicPr>
-            <a:picLocks noChangeAspect="1" noChangeArrowheads="1"/>
-          </p:cNvPicPr>
-          <p:nvPr/>
-        </p:nvPicPr>
-        <p:blipFill>
-          <a:blip r:embed="rId18">
-            <a:extLst>
-              <a:ext uri="{28A0092B-C50C-407E-A947-70E740481C1C}">
-                <a14:useLocalDpi xmlns:a14="http://schemas.microsoft.com/office/drawing/2010/main" val="0"/>
-              </a:ext>
-            </a:extLst>
-          </a:blip>
-          <a:srcRect/>
-          <a:stretch>
-            <a:fillRect/>
-          </a:stretch>
-        </p:blipFill>
-        <p:spPr bwMode="auto">
-          <a:xfrm>
-            <a:off x="12308563" y="9102477"/>
-            <a:ext cx="762000" cy="762000"/>
-          </a:xfrm>
-          <a:prstGeom prst="rect">
-            <a:avLst/>
-          </a:prstGeom>
-          <a:noFill/>
-          <a:ln>
-            <a:noFill/>
-          </a:ln>
-          <a:extLst>
-            <a:ext uri="{909E8E84-426E-40DD-AFC4-6F175D3DCCD1}">
-              <a14:hiddenFill xmlns:a14="http://schemas.microsoft.com/office/drawing/2010/main">
-                <a:solidFill>
-                  <a:srgbClr val="FFFFFF"/>
-                </a:solidFill>
-              </a14:hiddenFill>
-            </a:ext>
-            <a:ext uri="{91240B29-F687-4F45-9708-019B960494DF}">
-              <a14:hiddenLine xmlns:a14="http://schemas.microsoft.com/office/drawing/2010/main" w="9525">
-                <a:solidFill>
-                  <a:srgbClr val="000000"/>
-                </a:solidFill>
-                <a:miter lim="800000"/>
-                <a:headEnd/>
-                <a:tailEnd/>
-              </a14:hiddenLine>
-            </a:ext>
-          </a:extLst>
-        </p:spPr>
-      </p:pic>
-      <p:pic>
-        <p:nvPicPr>
-          <p:cNvPr id="63" name="Graphic 21">
-            <a:extLst>
-              <a:ext uri="{FF2B5EF4-FFF2-40B4-BE49-F238E27FC236}">
-                <a16:creationId xmlns:a16="http://schemas.microsoft.com/office/drawing/2014/main" id="{42B75D60-C1A5-4DC5-8A46-B143144EAF10}"/>
-              </a:ext>
-            </a:extLst>
-          </p:cNvPr>
-          <p:cNvPicPr>
-            <a:picLocks noChangeAspect="1" noChangeArrowheads="1"/>
-          </p:cNvPicPr>
-          <p:nvPr/>
-        </p:nvPicPr>
-        <p:blipFill>
-          <a:blip r:embed="rId19">
             <a:extLst>
               <a:ext uri="{28A0092B-C50C-407E-A947-70E740481C1C}">
                 <a14:useLocalDpi xmlns:a14="http://schemas.microsoft.com/office/drawing/2010/main" val="0"/>
@@ -7103,10 +6749,10 @@
           <p:nvPr/>
         </p:nvPicPr>
         <p:blipFill>
-          <a:blip r:embed="rId20">
+          <a:blip r:embed="rId18">
             <a:extLst>
               <a:ext uri="{96DAC541-7B7A-43D3-8B79-37D633B846F1}">
-                <asvg:svgBlip xmlns:asvg="http://schemas.microsoft.com/office/drawing/2016/SVG/main" r:embed="rId21"/>
+                <asvg:svgBlip xmlns:asvg="http://schemas.microsoft.com/office/drawing/2016/SVG/main" r:embed="rId19"/>
               </a:ext>
             </a:extLst>
           </a:blip>
@@ -7116,6 +6762,318 @@
         <p:spPr>
           <a:xfrm>
             <a:off x="5480366" y="4383072"/>
+            <a:ext cx="381000" cy="381000"/>
+          </a:xfrm>
+          <a:prstGeom prst="rect">
+            <a:avLst/>
+          </a:prstGeom>
+        </p:spPr>
+      </p:pic>
+      <p:sp>
+        <p:nvSpPr>
+          <p:cNvPr id="75" name="Rectangle 74">
+            <a:extLst>
+              <a:ext uri="{FF2B5EF4-FFF2-40B4-BE49-F238E27FC236}">
+                <a16:creationId xmlns:a16="http://schemas.microsoft.com/office/drawing/2014/main" id="{4DDA990D-4C92-4A36-B915-748448103B85}"/>
+              </a:ext>
+            </a:extLst>
+          </p:cNvPr>
+          <p:cNvSpPr/>
+          <p:nvPr/>
+        </p:nvSpPr>
+        <p:spPr>
+          <a:xfrm>
+            <a:off x="6547425" y="4583304"/>
+            <a:ext cx="2075688" cy="2294205"/>
+          </a:xfrm>
+          <a:prstGeom prst="rect">
+            <a:avLst/>
+          </a:prstGeom>
+          <a:solidFill>
+            <a:srgbClr val="1D8900">
+              <a:alpha val="9804"/>
+            </a:srgbClr>
+          </a:solidFill>
+          <a:ln w="12700">
+            <a:noFill/>
+            <a:prstDash val="dash"/>
+          </a:ln>
+        </p:spPr>
+        <p:style>
+          <a:lnRef idx="2">
+            <a:schemeClr val="accent1">
+              <a:shade val="50000"/>
+            </a:schemeClr>
+          </a:lnRef>
+          <a:fillRef idx="1">
+            <a:schemeClr val="accent1"/>
+          </a:fillRef>
+          <a:effectRef idx="0">
+            <a:schemeClr val="accent1"/>
+          </a:effectRef>
+          <a:fontRef idx="minor">
+            <a:schemeClr val="lt1"/>
+          </a:fontRef>
+        </p:style>
+        <p:txBody>
+          <a:bodyPr rot="0" spcFirstLastPara="0" vertOverflow="overflow" horzOverflow="overflow" vert="horz" wrap="square" lIns="502920" tIns="68580" rIns="137160" bIns="68580" numCol="1" spcCol="0" rtlCol="0" fromWordArt="0" anchor="t" anchorCtr="0" forceAA="0" compatLnSpc="1">
+            <a:prstTxWarp prst="textNoShape">
+              <a:avLst/>
+            </a:prstTxWarp>
+            <a:noAutofit/>
+          </a:bodyPr>
+          <a:lstStyle/>
+          <a:p>
+            <a:r>
+              <a:rPr lang="en-US" sz="1200" dirty="0">
+                <a:solidFill>
+                  <a:srgbClr val="1E8900"/>
+                </a:solidFill>
+                <a:latin typeface="Arial" panose="020B0604020202020204" pitchFamily="34" charset="0"/>
+                <a:cs typeface="Arial" panose="020B0604020202020204" pitchFamily="34" charset="0"/>
+              </a:rPr>
+              <a:t>Public subnet</a:t>
+            </a:r>
+          </a:p>
+        </p:txBody>
+      </p:sp>
+      <p:pic>
+        <p:nvPicPr>
+          <p:cNvPr id="76" name="Graphic 75">
+            <a:extLst>
+              <a:ext uri="{FF2B5EF4-FFF2-40B4-BE49-F238E27FC236}">
+                <a16:creationId xmlns:a16="http://schemas.microsoft.com/office/drawing/2014/main" id="{3E2ABB06-2B74-4794-BDC7-48FA93E802F5}"/>
+              </a:ext>
+            </a:extLst>
+          </p:cNvPr>
+          <p:cNvPicPr>
+            <a:picLocks noChangeAspect="1"/>
+          </p:cNvPicPr>
+          <p:nvPr/>
+        </p:nvPicPr>
+        <p:blipFill>
+          <a:blip r:embed="rId20">
+            <a:extLst>
+              <a:ext uri="{96DAC541-7B7A-43D3-8B79-37D633B846F1}">
+                <asvg:svgBlip xmlns:asvg="http://schemas.microsoft.com/office/drawing/2016/SVG/main" r:embed="rId21"/>
+              </a:ext>
+            </a:extLst>
+          </a:blip>
+          <a:stretch>
+            <a:fillRect/>
+          </a:stretch>
+        </p:blipFill>
+        <p:spPr>
+          <a:xfrm>
+            <a:off x="6547425" y="4583305"/>
+            <a:ext cx="381000" cy="381000"/>
+          </a:xfrm>
+          <a:prstGeom prst="rect">
+            <a:avLst/>
+          </a:prstGeom>
+        </p:spPr>
+      </p:pic>
+      <p:sp>
+        <p:nvSpPr>
+          <p:cNvPr id="77" name="Rectangle 76">
+            <a:extLst>
+              <a:ext uri="{FF2B5EF4-FFF2-40B4-BE49-F238E27FC236}">
+                <a16:creationId xmlns:a16="http://schemas.microsoft.com/office/drawing/2014/main" id="{25BEA593-E713-4EF1-8E8A-A70F1085D273}"/>
+              </a:ext>
+            </a:extLst>
+          </p:cNvPr>
+          <p:cNvSpPr/>
+          <p:nvPr/>
+        </p:nvSpPr>
+        <p:spPr>
+          <a:xfrm>
+            <a:off x="10507979" y="4573124"/>
+            <a:ext cx="2075688" cy="2294205"/>
+          </a:xfrm>
+          <a:prstGeom prst="rect">
+            <a:avLst/>
+          </a:prstGeom>
+          <a:solidFill>
+            <a:srgbClr val="1D8900">
+              <a:alpha val="9804"/>
+            </a:srgbClr>
+          </a:solidFill>
+          <a:ln w="12700">
+            <a:noFill/>
+            <a:prstDash val="dash"/>
+          </a:ln>
+        </p:spPr>
+        <p:style>
+          <a:lnRef idx="2">
+            <a:schemeClr val="accent1">
+              <a:shade val="50000"/>
+            </a:schemeClr>
+          </a:lnRef>
+          <a:fillRef idx="1">
+            <a:schemeClr val="accent1"/>
+          </a:fillRef>
+          <a:effectRef idx="0">
+            <a:schemeClr val="accent1"/>
+          </a:effectRef>
+          <a:fontRef idx="minor">
+            <a:schemeClr val="lt1"/>
+          </a:fontRef>
+        </p:style>
+        <p:txBody>
+          <a:bodyPr rot="0" spcFirstLastPara="0" vertOverflow="overflow" horzOverflow="overflow" vert="horz" wrap="square" lIns="502920" tIns="68580" rIns="137160" bIns="68580" numCol="1" spcCol="0" rtlCol="0" fromWordArt="0" anchor="t" anchorCtr="0" forceAA="0" compatLnSpc="1">
+            <a:prstTxWarp prst="textNoShape">
+              <a:avLst/>
+            </a:prstTxWarp>
+            <a:noAutofit/>
+          </a:bodyPr>
+          <a:lstStyle/>
+          <a:p>
+            <a:r>
+              <a:rPr lang="en-US" sz="1200" dirty="0">
+                <a:solidFill>
+                  <a:srgbClr val="1E8900"/>
+                </a:solidFill>
+                <a:latin typeface="Arial" panose="020B0604020202020204" pitchFamily="34" charset="0"/>
+                <a:cs typeface="Arial" panose="020B0604020202020204" pitchFamily="34" charset="0"/>
+              </a:rPr>
+              <a:t>Public subnet</a:t>
+            </a:r>
+          </a:p>
+        </p:txBody>
+      </p:sp>
+      <p:pic>
+        <p:nvPicPr>
+          <p:cNvPr id="78" name="Graphic 77">
+            <a:extLst>
+              <a:ext uri="{FF2B5EF4-FFF2-40B4-BE49-F238E27FC236}">
+                <a16:creationId xmlns:a16="http://schemas.microsoft.com/office/drawing/2014/main" id="{58BCE3E5-1ECD-48BC-A4B4-58590C508EE3}"/>
+              </a:ext>
+            </a:extLst>
+          </p:cNvPr>
+          <p:cNvPicPr>
+            <a:picLocks noChangeAspect="1"/>
+          </p:cNvPicPr>
+          <p:nvPr/>
+        </p:nvPicPr>
+        <p:blipFill>
+          <a:blip r:embed="rId20">
+            <a:extLst>
+              <a:ext uri="{96DAC541-7B7A-43D3-8B79-37D633B846F1}">
+                <asvg:svgBlip xmlns:asvg="http://schemas.microsoft.com/office/drawing/2016/SVG/main" r:embed="rId21"/>
+              </a:ext>
+            </a:extLst>
+          </a:blip>
+          <a:stretch>
+            <a:fillRect/>
+          </a:stretch>
+        </p:blipFill>
+        <p:spPr>
+          <a:xfrm>
+            <a:off x="10507979" y="4573125"/>
+            <a:ext cx="381000" cy="381000"/>
+          </a:xfrm>
+          <a:prstGeom prst="rect">
+            <a:avLst/>
+          </a:prstGeom>
+        </p:spPr>
+      </p:pic>
+      <p:sp>
+        <p:nvSpPr>
+          <p:cNvPr id="81" name="Rectangle 80">
+            <a:extLst>
+              <a:ext uri="{FF2B5EF4-FFF2-40B4-BE49-F238E27FC236}">
+                <a16:creationId xmlns:a16="http://schemas.microsoft.com/office/drawing/2014/main" id="{A97FD959-2657-4D69-AABC-059E75CDE7A7}"/>
+              </a:ext>
+            </a:extLst>
+          </p:cNvPr>
+          <p:cNvSpPr/>
+          <p:nvPr/>
+        </p:nvSpPr>
+        <p:spPr>
+          <a:xfrm>
+            <a:off x="13250973" y="4556576"/>
+            <a:ext cx="2075688" cy="2294205"/>
+          </a:xfrm>
+          <a:prstGeom prst="rect">
+            <a:avLst/>
+          </a:prstGeom>
+          <a:solidFill>
+            <a:srgbClr val="1D8900">
+              <a:alpha val="9804"/>
+            </a:srgbClr>
+          </a:solidFill>
+          <a:ln w="12700">
+            <a:noFill/>
+            <a:prstDash val="dash"/>
+          </a:ln>
+        </p:spPr>
+        <p:style>
+          <a:lnRef idx="2">
+            <a:schemeClr val="accent1">
+              <a:shade val="50000"/>
+            </a:schemeClr>
+          </a:lnRef>
+          <a:fillRef idx="1">
+            <a:schemeClr val="accent1"/>
+          </a:fillRef>
+          <a:effectRef idx="0">
+            <a:schemeClr val="accent1"/>
+          </a:effectRef>
+          <a:fontRef idx="minor">
+            <a:schemeClr val="lt1"/>
+          </a:fontRef>
+        </p:style>
+        <p:txBody>
+          <a:bodyPr rot="0" spcFirstLastPara="0" vertOverflow="overflow" horzOverflow="overflow" vert="horz" wrap="square" lIns="502920" tIns="68580" rIns="137160" bIns="68580" numCol="1" spcCol="0" rtlCol="0" fromWordArt="0" anchor="t" anchorCtr="0" forceAA="0" compatLnSpc="1">
+            <a:prstTxWarp prst="textNoShape">
+              <a:avLst/>
+            </a:prstTxWarp>
+            <a:noAutofit/>
+          </a:bodyPr>
+          <a:lstStyle/>
+          <a:p>
+            <a:r>
+              <a:rPr lang="en-US" sz="1200" dirty="0">
+                <a:solidFill>
+                  <a:srgbClr val="1E8900"/>
+                </a:solidFill>
+                <a:latin typeface="Arial" panose="020B0604020202020204" pitchFamily="34" charset="0"/>
+                <a:cs typeface="Arial" panose="020B0604020202020204" pitchFamily="34" charset="0"/>
+              </a:rPr>
+              <a:t>Public subnet</a:t>
+            </a:r>
+          </a:p>
+        </p:txBody>
+      </p:sp>
+      <p:pic>
+        <p:nvPicPr>
+          <p:cNvPr id="82" name="Graphic 81">
+            <a:extLst>
+              <a:ext uri="{FF2B5EF4-FFF2-40B4-BE49-F238E27FC236}">
+                <a16:creationId xmlns:a16="http://schemas.microsoft.com/office/drawing/2014/main" id="{FF758C1A-ABEF-4B87-A468-EB0F700B5F4C}"/>
+              </a:ext>
+            </a:extLst>
+          </p:cNvPr>
+          <p:cNvPicPr>
+            <a:picLocks noChangeAspect="1"/>
+          </p:cNvPicPr>
+          <p:nvPr/>
+        </p:nvPicPr>
+        <p:blipFill>
+          <a:blip r:embed="rId20">
+            <a:extLst>
+              <a:ext uri="{96DAC541-7B7A-43D3-8B79-37D633B846F1}">
+                <asvg:svgBlip xmlns:asvg="http://schemas.microsoft.com/office/drawing/2016/SVG/main" r:embed="rId21"/>
+              </a:ext>
+            </a:extLst>
+          </a:blip>
+          <a:stretch>
+            <a:fillRect/>
+          </a:stretch>
+        </p:blipFill>
+        <p:spPr>
+          <a:xfrm>
+            <a:off x="13250973" y="4556577"/>
             <a:ext cx="381000" cy="381000"/>
           </a:xfrm>
           <a:prstGeom prst="rect">

</xml_diff>